<commit_message>
Replace copyrighted code, clean up slide formatting
</commit_message>
<xml_diff>
--- a/units/3/lessons/6/resources/petascale-lesson-3.6-slides.pptx
+++ b/units/3/lessons/6/resources/petascale-lesson-3.6-slides.pptx
@@ -939,7 +939,7 @@
         </p:nvSpPr>
         <p:spPr>
           <a:xfrm>
-            <a:off x="381300" y="685800"/>
+            <a:off x="381000" y="685800"/>
             <a:ext cx="6096000" cy="3429000"/>
           </a:xfrm>
           <a:custGeom>
@@ -1509,7 +1509,7 @@
         </p:nvSpPr>
         <p:spPr>
           <a:xfrm>
-            <a:off x="381300" y="685800"/>
+            <a:off x="381000" y="685800"/>
             <a:ext cx="6096000" cy="3429000"/>
           </a:xfrm>
           <a:custGeom>
@@ -2510,7 +2510,7 @@
         </p:nvSpPr>
         <p:spPr>
           <a:xfrm>
-            <a:off x="381300" y="685800"/>
+            <a:off x="381000" y="685800"/>
             <a:ext cx="6096000" cy="3429000"/>
           </a:xfrm>
           <a:custGeom>
@@ -4282,7 +4282,7 @@
         </p:nvSpPr>
         <p:spPr>
           <a:xfrm>
-            <a:off x="381300" y="685800"/>
+            <a:off x="381000" y="685800"/>
             <a:ext cx="6096000" cy="3429000"/>
           </a:xfrm>
           <a:custGeom>
@@ -14403,14 +14403,14 @@
               <a:buNone/>
             </a:pPr>
             <a:r>
-              <a:rPr lang="en" sz="1300" b="1">
+              <a:rPr lang="en" sz="1300" b="1" dirty="0">
                 <a:solidFill>
                   <a:schemeClr val="dk1"/>
                 </a:solidFill>
               </a:rPr>
               <a:t>Submitting Jobs</a:t>
             </a:r>
-            <a:endParaRPr sz="1300" b="1">
+            <a:endParaRPr sz="1300" b="1" dirty="0">
               <a:solidFill>
                 <a:schemeClr val="dk1"/>
               </a:solidFill>
@@ -14427,7 +14427,7 @@
               <a:buNone/>
             </a:pPr>
             <a:r>
-              <a:rPr lang="en" sz="1300">
+              <a:rPr lang="en" sz="1300" dirty="0">
                 <a:solidFill>
                   <a:schemeClr val="dk1"/>
                 </a:solidFill>
@@ -14435,7 +14435,7 @@
               <a:t>Submitting a job is accomplished using a command named </a:t>
             </a:r>
             <a:r>
-              <a:rPr lang="en" sz="1300" b="1">
+              <a:rPr lang="en" sz="1300" b="1" dirty="0" err="1">
                 <a:solidFill>
                   <a:schemeClr val="dk1"/>
                 </a:solidFill>
@@ -14443,7 +14443,7 @@
               <a:t>salloc</a:t>
             </a:r>
             <a:r>
-              <a:rPr lang="en" sz="1300">
+              <a:rPr lang="en" sz="1300" dirty="0">
                 <a:solidFill>
                   <a:schemeClr val="dk1"/>
                 </a:solidFill>
@@ -14451,7 +14451,7 @@
               <a:t>. This command allows us to submit two different kinds of jobs: </a:t>
             </a:r>
             <a:r>
-              <a:rPr lang="en" sz="1300" b="1">
+              <a:rPr lang="en" sz="1300" b="1" dirty="0">
                 <a:solidFill>
                   <a:schemeClr val="dk1"/>
                 </a:solidFill>
@@ -14459,7 +14459,7 @@
               <a:t>interactive</a:t>
             </a:r>
             <a:r>
-              <a:rPr lang="en" sz="1300">
+              <a:rPr lang="en" sz="1300" dirty="0">
                 <a:solidFill>
                   <a:schemeClr val="dk1"/>
                 </a:solidFill>
@@ -14467,7 +14467,7 @@
               <a:t> jobs and </a:t>
             </a:r>
             <a:r>
-              <a:rPr lang="en" sz="1300" b="1">
+              <a:rPr lang="en" sz="1300" b="1" dirty="0">
                 <a:solidFill>
                   <a:schemeClr val="dk1"/>
                 </a:solidFill>
@@ -14475,14 +14475,14 @@
               <a:t>batch</a:t>
             </a:r>
             <a:r>
-              <a:rPr lang="en" sz="1300">
+              <a:rPr lang="en" sz="1300" dirty="0">
                 <a:solidFill>
                   <a:schemeClr val="dk1"/>
                 </a:solidFill>
               </a:rPr>
               <a:t> jobs. Interactive jobs are more common for compiling, testing and running R applications.</a:t>
             </a:r>
-            <a:endParaRPr sz="1300">
+            <a:endParaRPr sz="1300" dirty="0">
               <a:solidFill>
                 <a:schemeClr val="dk1"/>
               </a:solidFill>
@@ -14498,7 +14498,7 @@
               </a:spcAft>
               <a:buNone/>
             </a:pPr>
-            <a:endParaRPr sz="1300" b="1">
+            <a:endParaRPr sz="1300" b="1" dirty="0">
               <a:solidFill>
                 <a:schemeClr val="dk1"/>
               </a:solidFill>
@@ -14515,14 +14515,14 @@
               <a:buNone/>
             </a:pPr>
             <a:r>
-              <a:rPr lang="en" sz="1300" b="1">
+              <a:rPr lang="en" sz="1300" b="1" dirty="0">
                 <a:solidFill>
                   <a:schemeClr val="dk1"/>
                 </a:solidFill>
               </a:rPr>
               <a:t>Interactive Jobs:</a:t>
             </a:r>
-            <a:endParaRPr sz="1100">
+            <a:endParaRPr sz="1100" dirty="0">
               <a:solidFill>
                 <a:schemeClr val="dk1"/>
               </a:solidFill>
@@ -14542,7 +14542,7 @@
               </a:spcAft>
               <a:buNone/>
             </a:pPr>
-            <a:endParaRPr sz="1100">
+            <a:endParaRPr sz="1100" dirty="0">
               <a:solidFill>
                 <a:schemeClr val="dk1"/>
               </a:solidFill>
@@ -14563,7 +14563,7 @@
               <a:buNone/>
             </a:pPr>
             <a:r>
-              <a:rPr lang="en" sz="1100" b="1">
+              <a:rPr lang="en" sz="1100" b="1" dirty="0">
                 <a:solidFill>
                   <a:schemeClr val="dk1"/>
                 </a:solidFill>
@@ -14572,354 +14572,594 @@
                 <a:cs typeface="Source Code Pro"/>
                 <a:sym typeface="Source Code Pro"/>
               </a:rPr>
-              <a:t>$ salloc</a:t>
-            </a:r>
-            <a:r>
-              <a:rPr lang="en" sz="1100" b="1">
+              <a:t>$ </a:t>
+            </a:r>
+            <a:r>
+              <a:rPr lang="en" sz="1100" b="1" dirty="0" err="1">
+                <a:solidFill>
+                  <a:schemeClr val="dk1"/>
+                </a:solidFill>
+                <a:latin typeface="Consolas" charset="0"/>
+                <a:ea typeface="Consolas" charset="0"/>
+                <a:cs typeface="Consolas" charset="0"/>
+                <a:sym typeface="Source Code Pro"/>
+              </a:rPr>
+              <a:t>salloc</a:t>
+            </a:r>
+            <a:r>
+              <a:rPr lang="en" sz="1100" b="1" dirty="0">
                 <a:solidFill>
                   <a:schemeClr val="dk1"/>
                 </a:solidFill>
                 <a:highlight>
                   <a:srgbClr val="00FFFF"/>
                 </a:highlight>
-                <a:latin typeface="Source Code Pro"/>
-                <a:ea typeface="Source Code Pro"/>
-                <a:cs typeface="Source Code Pro"/>
+                <a:latin typeface="Consolas" charset="0"/>
+                <a:ea typeface="Consolas" charset="0"/>
+                <a:cs typeface="Consolas" charset="0"/>
                 <a:sym typeface="Source Code Pro"/>
               </a:rPr>
               <a:t> </a:t>
             </a:r>
             <a:r>
-              <a:rPr lang="en" sz="1100" b="1">
-                <a:solidFill>
-                  <a:schemeClr val="dk1"/>
-                </a:solidFill>
-                <a:latin typeface="Source Code Pro"/>
-                <a:ea typeface="Source Code Pro"/>
-                <a:cs typeface="Source Code Pro"/>
+              <a:rPr lang="en" sz="1100" b="1" dirty="0">
+                <a:solidFill>
+                  <a:schemeClr val="dk1"/>
+                </a:solidFill>
+                <a:latin typeface="Consolas" charset="0"/>
+                <a:ea typeface="Consolas" charset="0"/>
+                <a:cs typeface="Consolas" charset="0"/>
                 <a:sym typeface="Source Code Pro"/>
               </a:rPr>
               <a:t>--time=</a:t>
             </a:r>
             <a:r>
-              <a:rPr lang="en" sz="1100" b="1">
+              <a:rPr lang="en" sz="1100" b="1" dirty="0">
                 <a:solidFill>
                   <a:schemeClr val="dk1"/>
                 </a:solidFill>
                 <a:highlight>
                   <a:srgbClr val="FFFF00"/>
                 </a:highlight>
-                <a:latin typeface="Source Code Pro"/>
-                <a:ea typeface="Source Code Pro"/>
-                <a:cs typeface="Source Code Pro"/>
+                <a:latin typeface="Consolas" charset="0"/>
+                <a:ea typeface="Consolas" charset="0"/>
+                <a:cs typeface="Consolas" charset="0"/>
                 <a:sym typeface="Source Code Pro"/>
               </a:rPr>
               <a:t>&lt;hours&gt;</a:t>
             </a:r>
             <a:r>
-              <a:rPr lang="en" sz="1100" b="1">
-                <a:solidFill>
-                  <a:schemeClr val="dk1"/>
-                </a:solidFill>
-                <a:latin typeface="Source Code Pro"/>
-                <a:ea typeface="Source Code Pro"/>
-                <a:cs typeface="Source Code Pro"/>
+              <a:rPr lang="en" sz="1100" b="1" dirty="0">
+                <a:solidFill>
+                  <a:schemeClr val="dk1"/>
+                </a:solidFill>
+                <a:latin typeface="Consolas" charset="0"/>
+                <a:ea typeface="Consolas" charset="0"/>
+                <a:cs typeface="Consolas" charset="0"/>
                 <a:sym typeface="Source Code Pro"/>
               </a:rPr>
               <a:t>:</a:t>
             </a:r>
             <a:r>
-              <a:rPr lang="en" sz="1100" b="1">
+              <a:rPr lang="en" sz="1100" b="1" dirty="0">
                 <a:solidFill>
                   <a:schemeClr val="dk1"/>
                 </a:solidFill>
                 <a:highlight>
                   <a:srgbClr val="FFFF00"/>
                 </a:highlight>
-                <a:latin typeface="Source Code Pro"/>
-                <a:ea typeface="Source Code Pro"/>
-                <a:cs typeface="Source Code Pro"/>
+                <a:latin typeface="Consolas" charset="0"/>
+                <a:ea typeface="Consolas" charset="0"/>
+                <a:cs typeface="Consolas" charset="0"/>
                 <a:sym typeface="Source Code Pro"/>
               </a:rPr>
               <a:t>&lt;minutes&gt;</a:t>
             </a:r>
             <a:r>
-              <a:rPr lang="en" sz="1100" b="1">
-                <a:solidFill>
-                  <a:schemeClr val="dk1"/>
-                </a:solidFill>
-                <a:latin typeface="Source Code Pro"/>
-                <a:ea typeface="Source Code Pro"/>
-                <a:cs typeface="Source Code Pro"/>
+              <a:rPr lang="en" sz="1100" b="1" dirty="0">
+                <a:solidFill>
+                  <a:schemeClr val="dk1"/>
+                </a:solidFill>
+                <a:latin typeface="Consolas" charset="0"/>
+                <a:ea typeface="Consolas" charset="0"/>
+                <a:cs typeface="Consolas" charset="0"/>
                 <a:sym typeface="Source Code Pro"/>
               </a:rPr>
               <a:t>:</a:t>
             </a:r>
             <a:r>
-              <a:rPr lang="en" sz="1100" b="1">
+              <a:rPr lang="en" sz="1100" b="1" dirty="0">
                 <a:solidFill>
                   <a:schemeClr val="dk1"/>
                 </a:solidFill>
                 <a:highlight>
                   <a:srgbClr val="FFFF00"/>
                 </a:highlight>
-                <a:latin typeface="Source Code Pro"/>
-                <a:ea typeface="Source Code Pro"/>
-                <a:cs typeface="Source Code Pro"/>
+                <a:latin typeface="Consolas" charset="0"/>
+                <a:ea typeface="Consolas" charset="0"/>
+                <a:cs typeface="Consolas" charset="0"/>
                 <a:sym typeface="Source Code Pro"/>
               </a:rPr>
               <a:t>&lt;seconds&gt;</a:t>
             </a:r>
             <a:r>
-              <a:rPr lang="en" sz="1100" b="1">
+              <a:rPr lang="en" sz="1100" b="1" dirty="0">
                 <a:solidFill>
                   <a:schemeClr val="dk1"/>
                 </a:solidFill>
                 <a:highlight>
                   <a:srgbClr val="00FFFF"/>
                 </a:highlight>
-                <a:latin typeface="Source Code Pro"/>
-                <a:ea typeface="Source Code Pro"/>
-                <a:cs typeface="Source Code Pro"/>
+                <a:latin typeface="Consolas" charset="0"/>
+                <a:ea typeface="Consolas" charset="0"/>
+                <a:cs typeface="Consolas" charset="0"/>
                 <a:sym typeface="Source Code Pro"/>
               </a:rPr>
               <a:t> </a:t>
             </a:r>
             <a:r>
-              <a:rPr lang="en" sz="1100" b="1">
-                <a:solidFill>
-                  <a:schemeClr val="dk1"/>
-                </a:solidFill>
-                <a:latin typeface="Source Code Pro"/>
-                <a:ea typeface="Source Code Pro"/>
-                <a:cs typeface="Source Code Pro"/>
+              <a:rPr lang="en" sz="1100" b="1" dirty="0">
+                <a:solidFill>
+                  <a:schemeClr val="dk1"/>
+                </a:solidFill>
+                <a:latin typeface="Consolas" charset="0"/>
+                <a:ea typeface="Consolas" charset="0"/>
+                <a:cs typeface="Consolas" charset="0"/>
                 <a:sym typeface="Source Code Pro"/>
               </a:rPr>
               <a:t>--nodes=</a:t>
             </a:r>
             <a:r>
-              <a:rPr lang="en" sz="1100" b="1">
+              <a:rPr lang="en" sz="1100" b="1" dirty="0">
                 <a:solidFill>
                   <a:schemeClr val="dk1"/>
                 </a:solidFill>
                 <a:highlight>
                   <a:srgbClr val="FFFF00"/>
                 </a:highlight>
-                <a:latin typeface="Source Code Pro"/>
-                <a:ea typeface="Source Code Pro"/>
-                <a:cs typeface="Source Code Pro"/>
+                <a:latin typeface="Consolas" charset="0"/>
+                <a:ea typeface="Consolas" charset="0"/>
+                <a:cs typeface="Consolas" charset="0"/>
                 <a:sym typeface="Source Code Pro"/>
               </a:rPr>
               <a:t>&lt;# of compute nodes&gt;</a:t>
             </a:r>
             <a:r>
-              <a:rPr lang="en" sz="1100" b="1">
+              <a:rPr lang="en" sz="1100" b="1" dirty="0">
                 <a:solidFill>
                   <a:schemeClr val="dk1"/>
                 </a:solidFill>
                 <a:highlight>
                   <a:srgbClr val="00FFFF"/>
                 </a:highlight>
-                <a:latin typeface="Source Code Pro"/>
-                <a:ea typeface="Source Code Pro"/>
-                <a:cs typeface="Source Code Pro"/>
+                <a:latin typeface="Consolas" charset="0"/>
+                <a:ea typeface="Consolas" charset="0"/>
+                <a:cs typeface="Consolas" charset="0"/>
                 <a:sym typeface="Source Code Pro"/>
               </a:rPr>
               <a:t> </a:t>
             </a:r>
             <a:r>
-              <a:rPr lang="en" sz="1100" b="1">
-                <a:solidFill>
-                  <a:schemeClr val="dk1"/>
-                </a:solidFill>
-                <a:latin typeface="Source Code Pro"/>
-                <a:ea typeface="Source Code Pro"/>
-                <a:cs typeface="Source Code Pro"/>
+              <a:rPr lang="en" sz="1100" b="1" dirty="0">
+                <a:solidFill>
+                  <a:schemeClr val="dk1"/>
+                </a:solidFill>
+                <a:latin typeface="Consolas" charset="0"/>
+                <a:ea typeface="Consolas" charset="0"/>
+                <a:cs typeface="Consolas" charset="0"/>
                 <a:sym typeface="Source Code Pro"/>
               </a:rPr>
-              <a:t>--ntasks=</a:t>
-            </a:r>
-            <a:r>
-              <a:rPr lang="en" sz="1100" b="1">
+              <a:t>--</a:t>
+            </a:r>
+            <a:r>
+              <a:rPr lang="en" sz="1100" b="1" dirty="0" err="1">
+                <a:solidFill>
+                  <a:schemeClr val="dk1"/>
+                </a:solidFill>
+                <a:latin typeface="Consolas" charset="0"/>
+                <a:ea typeface="Consolas" charset="0"/>
+                <a:cs typeface="Consolas" charset="0"/>
+                <a:sym typeface="Source Code Pro"/>
+              </a:rPr>
+              <a:t>ntasks</a:t>
+            </a:r>
+            <a:r>
+              <a:rPr lang="en" sz="1100" b="1" dirty="0">
+                <a:solidFill>
+                  <a:schemeClr val="dk1"/>
+                </a:solidFill>
+                <a:latin typeface="Consolas" charset="0"/>
+                <a:ea typeface="Consolas" charset="0"/>
+                <a:cs typeface="Consolas" charset="0"/>
+                <a:sym typeface="Source Code Pro"/>
+              </a:rPr>
+              <a:t>=</a:t>
+            </a:r>
+            <a:r>
+              <a:rPr lang="en" sz="1100" b="1" dirty="0">
                 <a:solidFill>
                   <a:schemeClr val="dk1"/>
                 </a:solidFill>
                 <a:highlight>
                   <a:srgbClr val="FFFF00"/>
                 </a:highlight>
-                <a:latin typeface="Source Code Pro"/>
-                <a:ea typeface="Source Code Pro"/>
-                <a:cs typeface="Source Code Pro"/>
+                <a:latin typeface="Consolas" charset="0"/>
+                <a:ea typeface="Consolas" charset="0"/>
+                <a:cs typeface="Consolas" charset="0"/>
                 <a:sym typeface="Source Code Pro"/>
               </a:rPr>
-              <a:t>&lt;# of processes&gt;</a:t>
-            </a:r>
-            <a:r>
-              <a:rPr lang="en" sz="1100" b="1">
-                <a:solidFill>
-                  <a:schemeClr val="dk1"/>
-                </a:solidFill>
-                <a:latin typeface="Source Code Pro"/>
-                <a:ea typeface="Source Code Pro"/>
-                <a:cs typeface="Source Code Pro"/>
+              <a:t>&lt;# of processes</a:t>
+            </a:r>
+            <a:r>
+              <a:rPr lang="en" sz="1100" b="1" dirty="0" smtClean="0">
+                <a:solidFill>
+                  <a:schemeClr val="dk1"/>
+                </a:solidFill>
+                <a:highlight>
+                  <a:srgbClr val="FFFF00"/>
+                </a:highlight>
+                <a:latin typeface="Consolas" charset="0"/>
+                <a:ea typeface="Consolas" charset="0"/>
+                <a:cs typeface="Consolas" charset="0"/>
                 <a:sym typeface="Source Code Pro"/>
               </a:rPr>
-              <a:t>\</a:t>
-            </a:r>
-            <a:r>
-              <a:rPr lang="en" sz="1100" b="1">
+              <a:t>&gt;</a:t>
+            </a:r>
+            <a:r>
+              <a:rPr lang="en" sz="1100" b="1" dirty="0" smtClean="0">
                 <a:solidFill>
                   <a:schemeClr val="dk1"/>
                 </a:solidFill>
                 <a:highlight>
                   <a:srgbClr val="00FFFF"/>
                 </a:highlight>
-                <a:latin typeface="Source Code Pro"/>
-                <a:ea typeface="Source Code Pro"/>
-                <a:cs typeface="Source Code Pro"/>
+                <a:latin typeface="Consolas" charset="0"/>
+                <a:ea typeface="Consolas" charset="0"/>
+                <a:cs typeface="Consolas" charset="0"/>
                 <a:sym typeface="Source Code Pro"/>
               </a:rPr>
               <a:t> </a:t>
             </a:r>
             <a:r>
-              <a:rPr lang="en" sz="1100" b="1">
-                <a:solidFill>
-                  <a:schemeClr val="dk1"/>
-                </a:solidFill>
-                <a:latin typeface="Source Code Pro"/>
-                <a:ea typeface="Source Code Pro"/>
-                <a:cs typeface="Source Code Pro"/>
+              <a:rPr lang="en-US" sz="1100" b="1" dirty="0" smtClean="0">
+                <a:solidFill>
+                  <a:schemeClr val="dk1"/>
+                </a:solidFill>
+                <a:highlight>
+                  <a:srgbClr val="00FFFF"/>
+                </a:highlight>
+                <a:latin typeface="Consolas" charset="0"/>
+                <a:ea typeface="Consolas" charset="0"/>
+                <a:cs typeface="Consolas" charset="0"/>
                 <a:sym typeface="Source Code Pro"/>
               </a:rPr>
-              <a:t>--cpus-per-task=</a:t>
-            </a:r>
-            <a:r>
-              <a:rPr lang="en" sz="1100" b="1">
+              <a:t/>
+            </a:r>
+            <a:br>
+              <a:rPr lang="en-US" sz="1100" b="1" dirty="0" smtClean="0">
+                <a:solidFill>
+                  <a:schemeClr val="dk1"/>
+                </a:solidFill>
+                <a:highlight>
+                  <a:srgbClr val="00FFFF"/>
+                </a:highlight>
+                <a:latin typeface="Consolas" charset="0"/>
+                <a:ea typeface="Consolas" charset="0"/>
+                <a:cs typeface="Consolas" charset="0"/>
+                <a:sym typeface="Source Code Pro"/>
+              </a:rPr>
+            </a:br>
+            <a:r>
+              <a:rPr lang="en" sz="1100" b="1" dirty="0" smtClean="0">
+                <a:solidFill>
+                  <a:schemeClr val="dk1"/>
+                </a:solidFill>
+                <a:latin typeface="Consolas" charset="0"/>
+                <a:ea typeface="Consolas" charset="0"/>
+                <a:cs typeface="Consolas" charset="0"/>
+                <a:sym typeface="Source Code Pro"/>
+              </a:rPr>
+              <a:t>--</a:t>
+            </a:r>
+            <a:r>
+              <a:rPr lang="en" sz="1100" b="1" dirty="0" err="1">
+                <a:solidFill>
+                  <a:schemeClr val="dk1"/>
+                </a:solidFill>
+                <a:latin typeface="Consolas" charset="0"/>
+                <a:ea typeface="Consolas" charset="0"/>
+                <a:cs typeface="Consolas" charset="0"/>
+                <a:sym typeface="Source Code Pro"/>
+              </a:rPr>
+              <a:t>cpus</a:t>
+            </a:r>
+            <a:r>
+              <a:rPr lang="en" sz="1100" b="1" dirty="0">
+                <a:solidFill>
+                  <a:schemeClr val="dk1"/>
+                </a:solidFill>
+                <a:latin typeface="Consolas" charset="0"/>
+                <a:ea typeface="Consolas" charset="0"/>
+                <a:cs typeface="Consolas" charset="0"/>
+                <a:sym typeface="Source Code Pro"/>
+              </a:rPr>
+              <a:t>-per-task=</a:t>
+            </a:r>
+            <a:r>
+              <a:rPr lang="en" sz="1100" b="1" dirty="0">
                 <a:solidFill>
                   <a:schemeClr val="dk1"/>
                 </a:solidFill>
                 <a:highlight>
                   <a:srgbClr val="FFFF00"/>
                 </a:highlight>
-                <a:latin typeface="Source Code Pro"/>
-                <a:ea typeface="Source Code Pro"/>
-                <a:cs typeface="Source Code Pro"/>
+                <a:latin typeface="Consolas" charset="0"/>
+                <a:ea typeface="Consolas" charset="0"/>
+                <a:cs typeface="Consolas" charset="0"/>
                 <a:sym typeface="Source Code Pro"/>
               </a:rPr>
-              <a:t>&lt;# cpus/process/thread&gt;</a:t>
-            </a:r>
-            <a:r>
-              <a:rPr lang="en" sz="1100" b="1">
+              <a:t>&lt;# </a:t>
+            </a:r>
+            <a:r>
+              <a:rPr lang="en" sz="1100" b="1" dirty="0" err="1">
+                <a:solidFill>
+                  <a:schemeClr val="dk1"/>
+                </a:solidFill>
+                <a:highlight>
+                  <a:srgbClr val="FFFF00"/>
+                </a:highlight>
+                <a:latin typeface="Consolas" charset="0"/>
+                <a:ea typeface="Consolas" charset="0"/>
+                <a:cs typeface="Consolas" charset="0"/>
+                <a:sym typeface="Source Code Pro"/>
+              </a:rPr>
+              <a:t>cpus</a:t>
+            </a:r>
+            <a:r>
+              <a:rPr lang="en" sz="1100" b="1" dirty="0">
+                <a:solidFill>
+                  <a:schemeClr val="dk1"/>
+                </a:solidFill>
+                <a:highlight>
+                  <a:srgbClr val="FFFF00"/>
+                </a:highlight>
+                <a:latin typeface="Consolas" charset="0"/>
+                <a:ea typeface="Consolas" charset="0"/>
+                <a:cs typeface="Consolas" charset="0"/>
+                <a:sym typeface="Source Code Pro"/>
+              </a:rPr>
+              <a:t>/process/thread&gt;</a:t>
+            </a:r>
+            <a:r>
+              <a:rPr lang="en" sz="1100" b="1" dirty="0">
                 <a:solidFill>
                   <a:schemeClr val="dk1"/>
                 </a:solidFill>
                 <a:highlight>
                   <a:srgbClr val="00FFFF"/>
                 </a:highlight>
-                <a:latin typeface="Source Code Pro"/>
-                <a:ea typeface="Source Code Pro"/>
-                <a:cs typeface="Source Code Pro"/>
+                <a:latin typeface="Consolas" charset="0"/>
+                <a:ea typeface="Consolas" charset="0"/>
+                <a:cs typeface="Consolas" charset="0"/>
                 <a:sym typeface="Source Code Pro"/>
               </a:rPr>
               <a:t> </a:t>
             </a:r>
             <a:r>
-              <a:rPr lang="en" sz="1100" b="1">
-                <a:solidFill>
-                  <a:schemeClr val="dk1"/>
-                </a:solidFill>
-                <a:latin typeface="Source Code Pro"/>
-                <a:ea typeface="Source Code Pro"/>
-                <a:cs typeface="Source Code Pro"/>
+              <a:rPr lang="en" sz="1100" b="1" dirty="0">
+                <a:solidFill>
+                  <a:schemeClr val="dk1"/>
+                </a:solidFill>
+                <a:latin typeface="Consolas" charset="0"/>
+                <a:ea typeface="Consolas" charset="0"/>
+                <a:cs typeface="Consolas" charset="0"/>
                 <a:sym typeface="Source Code Pro"/>
               </a:rPr>
-              <a:t>--mem-per-cpu=</a:t>
-            </a:r>
-            <a:r>
-              <a:rPr lang="en" sz="1100" b="1">
+              <a:t>--mem-per-</a:t>
+            </a:r>
+            <a:r>
+              <a:rPr lang="en" sz="1100" b="1" dirty="0" err="1">
+                <a:solidFill>
+                  <a:schemeClr val="dk1"/>
+                </a:solidFill>
+                <a:latin typeface="Consolas" charset="0"/>
+                <a:ea typeface="Consolas" charset="0"/>
+                <a:cs typeface="Consolas" charset="0"/>
+                <a:sym typeface="Source Code Pro"/>
+              </a:rPr>
+              <a:t>cpu</a:t>
+            </a:r>
+            <a:r>
+              <a:rPr lang="en" sz="1100" b="1" dirty="0">
+                <a:solidFill>
+                  <a:schemeClr val="dk1"/>
+                </a:solidFill>
+                <a:latin typeface="Consolas" charset="0"/>
+                <a:ea typeface="Consolas" charset="0"/>
+                <a:cs typeface="Consolas" charset="0"/>
+                <a:sym typeface="Source Code Pro"/>
+              </a:rPr>
+              <a:t>=</a:t>
+            </a:r>
+            <a:r>
+              <a:rPr lang="en" sz="1100" b="1" dirty="0">
                 <a:solidFill>
                   <a:schemeClr val="dk1"/>
                 </a:solidFill>
                 <a:highlight>
                   <a:srgbClr val="FFFF00"/>
                 </a:highlight>
-                <a:latin typeface="Source Code Pro"/>
-                <a:ea typeface="Source Code Pro"/>
-                <a:cs typeface="Source Code Pro"/>
+                <a:latin typeface="Consolas" charset="0"/>
+                <a:ea typeface="Consolas" charset="0"/>
+                <a:cs typeface="Consolas" charset="0"/>
                 <a:sym typeface="Source Code Pro"/>
               </a:rPr>
-              <a:t>&lt;amount of RAM per core&gt;</a:t>
-            </a:r>
-            <a:r>
-              <a:rPr lang="en" sz="1100" b="1">
-                <a:solidFill>
-                  <a:schemeClr val="dk1"/>
-                </a:solidFill>
-                <a:latin typeface="Source Code Pro"/>
-                <a:ea typeface="Source Code Pro"/>
-                <a:cs typeface="Source Code Pro"/>
+              <a:t>&lt;amount of RAM per core</a:t>
+            </a:r>
+            <a:r>
+              <a:rPr lang="en" sz="1100" b="1" dirty="0" smtClean="0">
+                <a:solidFill>
+                  <a:schemeClr val="dk1"/>
+                </a:solidFill>
+                <a:highlight>
+                  <a:srgbClr val="FFFF00"/>
+                </a:highlight>
+                <a:latin typeface="Consolas" charset="0"/>
+                <a:ea typeface="Consolas" charset="0"/>
+                <a:cs typeface="Consolas" charset="0"/>
                 <a:sym typeface="Source Code Pro"/>
               </a:rPr>
-              <a:t>\</a:t>
-            </a:r>
-            <a:r>
-              <a:rPr lang="en" sz="1100" b="1">
+              <a:t>&gt;</a:t>
+            </a:r>
+            <a:r>
+              <a:rPr lang="en" sz="1100" b="1" dirty="0" smtClean="0">
                 <a:solidFill>
                   <a:schemeClr val="dk1"/>
                 </a:solidFill>
                 <a:highlight>
                   <a:srgbClr val="00FFFF"/>
                 </a:highlight>
-                <a:latin typeface="Source Code Pro"/>
-                <a:ea typeface="Source Code Pro"/>
-                <a:cs typeface="Source Code Pro"/>
+                <a:latin typeface="Consolas" charset="0"/>
+                <a:ea typeface="Consolas" charset="0"/>
+                <a:cs typeface="Consolas" charset="0"/>
                 <a:sym typeface="Source Code Pro"/>
               </a:rPr>
               <a:t> </a:t>
             </a:r>
             <a:r>
-              <a:rPr lang="en" sz="1100" b="1">
-                <a:solidFill>
-                  <a:schemeClr val="dk1"/>
-                </a:solidFill>
-                <a:latin typeface="Source Code Pro"/>
-                <a:ea typeface="Source Code Pro"/>
-                <a:cs typeface="Source Code Pro"/>
+              <a:rPr lang="en-US" sz="1100" b="1" dirty="0" smtClean="0">
+                <a:solidFill>
+                  <a:schemeClr val="dk1"/>
+                </a:solidFill>
+                <a:highlight>
+                  <a:srgbClr val="00FFFF"/>
+                </a:highlight>
+                <a:latin typeface="Consolas" charset="0"/>
+                <a:ea typeface="Consolas" charset="0"/>
+                <a:cs typeface="Consolas" charset="0"/>
                 <a:sym typeface="Source Code Pro"/>
               </a:rPr>
-              <a:t>--account=</a:t>
-            </a:r>
-            <a:r>
-              <a:rPr lang="en" sz="1100" b="1">
+              <a:t/>
+            </a:r>
+            <a:br>
+              <a:rPr lang="en-US" sz="1100" b="1" dirty="0" smtClean="0">
+                <a:solidFill>
+                  <a:schemeClr val="dk1"/>
+                </a:solidFill>
+                <a:highlight>
+                  <a:srgbClr val="00FFFF"/>
+                </a:highlight>
+                <a:latin typeface="Consolas" charset="0"/>
+                <a:ea typeface="Consolas" charset="0"/>
+                <a:cs typeface="Consolas" charset="0"/>
+                <a:sym typeface="Source Code Pro"/>
+              </a:rPr>
+            </a:br>
+            <a:r>
+              <a:rPr lang="en" sz="1100" b="1" dirty="0" smtClean="0">
+                <a:solidFill>
+                  <a:schemeClr val="dk1"/>
+                </a:solidFill>
+                <a:latin typeface="Consolas" charset="0"/>
+                <a:ea typeface="Consolas" charset="0"/>
+                <a:cs typeface="Consolas" charset="0"/>
+                <a:sym typeface="Source Code Pro"/>
+              </a:rPr>
+              <a:t>--</a:t>
+            </a:r>
+            <a:r>
+              <a:rPr lang="en" sz="1100" b="1" dirty="0">
+                <a:solidFill>
+                  <a:schemeClr val="dk1"/>
+                </a:solidFill>
+                <a:latin typeface="Consolas" charset="0"/>
+                <a:ea typeface="Consolas" charset="0"/>
+                <a:cs typeface="Consolas" charset="0"/>
+                <a:sym typeface="Source Code Pro"/>
+              </a:rPr>
+              <a:t>account=</a:t>
+            </a:r>
+            <a:r>
+              <a:rPr lang="en" sz="1100" b="1" dirty="0">
                 <a:solidFill>
                   <a:schemeClr val="dk1"/>
                 </a:solidFill>
                 <a:highlight>
                   <a:srgbClr val="FFFF00"/>
                 </a:highlight>
-                <a:latin typeface="Source Code Pro"/>
-                <a:ea typeface="Source Code Pro"/>
-                <a:cs typeface="Source Code Pro"/>
+                <a:latin typeface="Consolas" charset="0"/>
+                <a:ea typeface="Consolas" charset="0"/>
+                <a:cs typeface="Consolas" charset="0"/>
                 <a:sym typeface="Source Code Pro"/>
               </a:rPr>
-              <a:t>&lt;def-username&gt;</a:t>
-            </a:r>
-            <a:r>
-              <a:rPr lang="en" sz="1100" b="1">
+              <a:t>&lt;</a:t>
+            </a:r>
+            <a:r>
+              <a:rPr lang="en" sz="1100" b="1" dirty="0" err="1">
+                <a:solidFill>
+                  <a:schemeClr val="dk1"/>
+                </a:solidFill>
+                <a:highlight>
+                  <a:srgbClr val="FFFF00"/>
+                </a:highlight>
+                <a:latin typeface="Consolas" charset="0"/>
+                <a:ea typeface="Consolas" charset="0"/>
+                <a:cs typeface="Consolas" charset="0"/>
+                <a:sym typeface="Source Code Pro"/>
+              </a:rPr>
+              <a:t>def</a:t>
+            </a:r>
+            <a:r>
+              <a:rPr lang="en" sz="1100" b="1" dirty="0">
+                <a:solidFill>
+                  <a:schemeClr val="dk1"/>
+                </a:solidFill>
+                <a:highlight>
+                  <a:srgbClr val="FFFF00"/>
+                </a:highlight>
+                <a:latin typeface="Consolas" charset="0"/>
+                <a:ea typeface="Consolas" charset="0"/>
+                <a:cs typeface="Consolas" charset="0"/>
+                <a:sym typeface="Source Code Pro"/>
+              </a:rPr>
+              <a:t>-username&gt;</a:t>
+            </a:r>
+            <a:r>
+              <a:rPr lang="en" sz="1100" b="1" dirty="0">
                 <a:solidFill>
                   <a:schemeClr val="dk1"/>
                 </a:solidFill>
                 <a:highlight>
                   <a:srgbClr val="00FF00"/>
                 </a:highlight>
-                <a:latin typeface="Source Code Pro"/>
-                <a:ea typeface="Source Code Pro"/>
-                <a:cs typeface="Source Code Pro"/>
+                <a:latin typeface="Consolas" charset="0"/>
+                <a:ea typeface="Consolas" charset="0"/>
+                <a:cs typeface="Consolas" charset="0"/>
                 <a:sym typeface="Source Code Pro"/>
               </a:rPr>
               <a:t>&lt;ENTER&gt;</a:t>
             </a:r>
-            <a:endParaRPr sz="1100">
+            <a:endParaRPr sz="1100" dirty="0">
+              <a:solidFill>
+                <a:schemeClr val="dk1"/>
+              </a:solidFill>
+              <a:latin typeface="Consolas" charset="0"/>
+              <a:ea typeface="Consolas" charset="0"/>
+              <a:cs typeface="Consolas" charset="0"/>
+              <a:sym typeface="Arial"/>
+            </a:endParaRPr>
+          </a:p>
+          <a:p>
+            <a:pPr marL="0" lvl="0" indent="0" algn="l" rtl="0">
+              <a:spcBef>
+                <a:spcPts val="0"/>
+              </a:spcBef>
+              <a:spcAft>
+                <a:spcPts val="0"/>
+              </a:spcAft>
+              <a:buNone/>
+            </a:pPr>
+            <a:endParaRPr sz="1100" dirty="0">
               <a:solidFill>
                 <a:schemeClr val="dk1"/>
               </a:solidFill>
@@ -14939,14 +15179,343 @@
               </a:spcAft>
               <a:buNone/>
             </a:pPr>
-            <a:endParaRPr sz="1100">
+            <a:r>
+              <a:rPr lang="en" sz="1300" b="1" dirty="0">
+                <a:solidFill>
+                  <a:schemeClr val="dk1"/>
+                </a:solidFill>
+                <a:latin typeface="Consolas" charset="0"/>
+                <a:ea typeface="Consolas" charset="0"/>
+                <a:cs typeface="Consolas" charset="0"/>
+                <a:sym typeface="Source Code Pro"/>
+              </a:rPr>
+              <a:t>$ </a:t>
+            </a:r>
+            <a:r>
+              <a:rPr lang="en" sz="1300" b="1" dirty="0" err="1">
+                <a:solidFill>
+                  <a:schemeClr val="dk1"/>
+                </a:solidFill>
+                <a:latin typeface="Consolas" charset="0"/>
+                <a:ea typeface="Consolas" charset="0"/>
+                <a:cs typeface="Consolas" charset="0"/>
+                <a:sym typeface="Source Code Pro"/>
+              </a:rPr>
+              <a:t>salloc</a:t>
+            </a:r>
+            <a:r>
+              <a:rPr lang="en" sz="1300" b="1" dirty="0">
+                <a:solidFill>
+                  <a:schemeClr val="dk1"/>
+                </a:solidFill>
+                <a:highlight>
+                  <a:srgbClr val="00FFFF"/>
+                </a:highlight>
+                <a:latin typeface="Consolas" charset="0"/>
+                <a:ea typeface="Consolas" charset="0"/>
+                <a:cs typeface="Consolas" charset="0"/>
+                <a:sym typeface="Source Code Pro"/>
+              </a:rPr>
+              <a:t> </a:t>
+            </a:r>
+            <a:r>
+              <a:rPr lang="en" sz="1300" b="1" dirty="0">
+                <a:solidFill>
+                  <a:schemeClr val="dk1"/>
+                </a:solidFill>
+                <a:latin typeface="Consolas" charset="0"/>
+                <a:ea typeface="Consolas" charset="0"/>
+                <a:cs typeface="Consolas" charset="0"/>
+                <a:sym typeface="Source Code Pro"/>
+              </a:rPr>
+              <a:t>--time=0:20:0</a:t>
+            </a:r>
+            <a:r>
+              <a:rPr lang="en" sz="1300" b="1" dirty="0">
+                <a:solidFill>
+                  <a:schemeClr val="dk1"/>
+                </a:solidFill>
+                <a:highlight>
+                  <a:srgbClr val="00FFFF"/>
+                </a:highlight>
+                <a:latin typeface="Consolas" charset="0"/>
+                <a:ea typeface="Consolas" charset="0"/>
+                <a:cs typeface="Consolas" charset="0"/>
+                <a:sym typeface="Source Code Pro"/>
+              </a:rPr>
+              <a:t> </a:t>
+            </a:r>
+            <a:r>
+              <a:rPr lang="en" sz="1300" b="1" dirty="0">
+                <a:solidFill>
+                  <a:schemeClr val="dk1"/>
+                </a:solidFill>
+                <a:latin typeface="Consolas" charset="0"/>
+                <a:ea typeface="Consolas" charset="0"/>
+                <a:cs typeface="Consolas" charset="0"/>
+                <a:sym typeface="Source Code Pro"/>
+              </a:rPr>
+              <a:t>--nodes=2</a:t>
+            </a:r>
+            <a:r>
+              <a:rPr lang="en" sz="1300" b="1" dirty="0">
+                <a:solidFill>
+                  <a:schemeClr val="dk1"/>
+                </a:solidFill>
+                <a:highlight>
+                  <a:srgbClr val="00FFFF"/>
+                </a:highlight>
+                <a:latin typeface="Consolas" charset="0"/>
+                <a:ea typeface="Consolas" charset="0"/>
+                <a:cs typeface="Consolas" charset="0"/>
+                <a:sym typeface="Source Code Pro"/>
+              </a:rPr>
+              <a:t> </a:t>
+            </a:r>
+            <a:r>
+              <a:rPr lang="en" sz="1300" b="1" dirty="0">
+                <a:solidFill>
+                  <a:schemeClr val="dk1"/>
+                </a:solidFill>
+                <a:latin typeface="Consolas" charset="0"/>
+                <a:ea typeface="Consolas" charset="0"/>
+                <a:cs typeface="Consolas" charset="0"/>
+                <a:sym typeface="Source Code Pro"/>
+              </a:rPr>
+              <a:t>--</a:t>
+            </a:r>
+            <a:r>
+              <a:rPr lang="en" sz="1300" b="1" dirty="0" err="1">
+                <a:solidFill>
+                  <a:schemeClr val="dk1"/>
+                </a:solidFill>
+                <a:latin typeface="Consolas" charset="0"/>
+                <a:ea typeface="Consolas" charset="0"/>
+                <a:cs typeface="Consolas" charset="0"/>
+                <a:sym typeface="Source Code Pro"/>
+              </a:rPr>
+              <a:t>ntasks</a:t>
+            </a:r>
+            <a:r>
+              <a:rPr lang="en" sz="1300" b="1" dirty="0">
+                <a:solidFill>
+                  <a:schemeClr val="dk1"/>
+                </a:solidFill>
+                <a:latin typeface="Consolas" charset="0"/>
+                <a:ea typeface="Consolas" charset="0"/>
+                <a:cs typeface="Consolas" charset="0"/>
+                <a:sym typeface="Source Code Pro"/>
+              </a:rPr>
+              <a:t>=64</a:t>
+            </a:r>
+            <a:r>
+              <a:rPr lang="en" sz="1300" b="1" dirty="0">
+                <a:solidFill>
+                  <a:schemeClr val="dk1"/>
+                </a:solidFill>
+                <a:highlight>
+                  <a:srgbClr val="00FFFF"/>
+                </a:highlight>
+                <a:latin typeface="Consolas" charset="0"/>
+                <a:ea typeface="Consolas" charset="0"/>
+                <a:cs typeface="Consolas" charset="0"/>
+                <a:sym typeface="Source Code Pro"/>
+              </a:rPr>
+              <a:t> </a:t>
+            </a:r>
+            <a:r>
+              <a:rPr lang="en" sz="1300" b="1" dirty="0">
+                <a:solidFill>
+                  <a:schemeClr val="dk1"/>
+                </a:solidFill>
+                <a:latin typeface="Consolas" charset="0"/>
+                <a:ea typeface="Consolas" charset="0"/>
+                <a:cs typeface="Consolas" charset="0"/>
+                <a:sym typeface="Source Code Pro"/>
+              </a:rPr>
+              <a:t>--</a:t>
+            </a:r>
+            <a:r>
+              <a:rPr lang="en" sz="1300" b="1" dirty="0" err="1">
+                <a:solidFill>
+                  <a:schemeClr val="dk1"/>
+                </a:solidFill>
+                <a:latin typeface="Consolas" charset="0"/>
+                <a:ea typeface="Consolas" charset="0"/>
+                <a:cs typeface="Consolas" charset="0"/>
+                <a:sym typeface="Source Code Pro"/>
+              </a:rPr>
+              <a:t>cpus</a:t>
+            </a:r>
+            <a:r>
+              <a:rPr lang="en" sz="1300" b="1" dirty="0">
+                <a:solidFill>
+                  <a:schemeClr val="dk1"/>
+                </a:solidFill>
+                <a:latin typeface="Consolas" charset="0"/>
+                <a:ea typeface="Consolas" charset="0"/>
+                <a:cs typeface="Consolas" charset="0"/>
+                <a:sym typeface="Source Code Pro"/>
+              </a:rPr>
+              <a:t>-per-task=1</a:t>
+            </a:r>
+            <a:r>
+              <a:rPr lang="en" sz="1300" b="1" dirty="0">
+                <a:solidFill>
+                  <a:schemeClr val="dk1"/>
+                </a:solidFill>
+                <a:highlight>
+                  <a:srgbClr val="00FFFF"/>
+                </a:highlight>
+                <a:latin typeface="Consolas" charset="0"/>
+                <a:ea typeface="Consolas" charset="0"/>
+                <a:cs typeface="Consolas" charset="0"/>
+                <a:sym typeface="Source Code Pro"/>
+              </a:rPr>
+              <a:t> </a:t>
+            </a:r>
+            <a:r>
+              <a:rPr lang="en" sz="1300" b="1" dirty="0">
+                <a:solidFill>
+                  <a:schemeClr val="dk1"/>
+                </a:solidFill>
+                <a:latin typeface="Consolas" charset="0"/>
+                <a:ea typeface="Consolas" charset="0"/>
+                <a:cs typeface="Consolas" charset="0"/>
+                <a:sym typeface="Source Code Pro"/>
+              </a:rPr>
+              <a:t>--mem-per-</a:t>
+            </a:r>
+            <a:r>
+              <a:rPr lang="en" sz="1300" b="1" dirty="0" err="1">
+                <a:solidFill>
+                  <a:schemeClr val="dk1"/>
+                </a:solidFill>
+                <a:latin typeface="Consolas" charset="0"/>
+                <a:ea typeface="Consolas" charset="0"/>
+                <a:cs typeface="Consolas" charset="0"/>
+                <a:sym typeface="Source Code Pro"/>
+              </a:rPr>
+              <a:t>cpu</a:t>
+            </a:r>
+            <a:r>
+              <a:rPr lang="en" sz="1300" b="1" dirty="0">
+                <a:solidFill>
+                  <a:schemeClr val="dk1"/>
+                </a:solidFill>
+                <a:latin typeface="Consolas" charset="0"/>
+                <a:ea typeface="Consolas" charset="0"/>
+                <a:cs typeface="Consolas" charset="0"/>
+                <a:sym typeface="Source Code Pro"/>
+              </a:rPr>
+              <a:t>=1GB</a:t>
+            </a:r>
+            <a:r>
+              <a:rPr lang="en" sz="1300" b="1" dirty="0">
+                <a:solidFill>
+                  <a:schemeClr val="dk1"/>
+                </a:solidFill>
+                <a:highlight>
+                  <a:srgbClr val="00FFFF"/>
+                </a:highlight>
+                <a:latin typeface="Consolas" charset="0"/>
+                <a:ea typeface="Consolas" charset="0"/>
+                <a:cs typeface="Consolas" charset="0"/>
+                <a:sym typeface="Source Code Pro"/>
+              </a:rPr>
+              <a:t> </a:t>
+            </a:r>
+            <a:r>
+              <a:rPr lang="en-US" sz="1300" b="1" dirty="0" smtClean="0">
+                <a:solidFill>
+                  <a:schemeClr val="dk1"/>
+                </a:solidFill>
+                <a:highlight>
+                  <a:srgbClr val="00FFFF"/>
+                </a:highlight>
+                <a:latin typeface="Consolas" charset="0"/>
+                <a:ea typeface="Consolas" charset="0"/>
+                <a:cs typeface="Consolas" charset="0"/>
+                <a:sym typeface="Source Code Pro"/>
+              </a:rPr>
+              <a:t/>
+            </a:r>
+            <a:br>
+              <a:rPr lang="en-US" sz="1300" b="1" dirty="0" smtClean="0">
+                <a:solidFill>
+                  <a:schemeClr val="dk1"/>
+                </a:solidFill>
+                <a:highlight>
+                  <a:srgbClr val="00FFFF"/>
+                </a:highlight>
+                <a:latin typeface="Consolas" charset="0"/>
+                <a:ea typeface="Consolas" charset="0"/>
+                <a:cs typeface="Consolas" charset="0"/>
+                <a:sym typeface="Source Code Pro"/>
+              </a:rPr>
+            </a:br>
+            <a:r>
+              <a:rPr lang="en" sz="1300" b="1" dirty="0" smtClean="0">
+                <a:solidFill>
+                  <a:schemeClr val="dk1"/>
+                </a:solidFill>
+                <a:latin typeface="Consolas" charset="0"/>
+                <a:ea typeface="Consolas" charset="0"/>
+                <a:cs typeface="Consolas" charset="0"/>
+                <a:sym typeface="Source Code Pro"/>
+              </a:rPr>
+              <a:t>--</a:t>
+            </a:r>
+            <a:r>
+              <a:rPr lang="en" sz="1300" b="1" dirty="0">
+                <a:solidFill>
+                  <a:schemeClr val="dk1"/>
+                </a:solidFill>
+                <a:latin typeface="Consolas" charset="0"/>
+                <a:ea typeface="Consolas" charset="0"/>
+                <a:cs typeface="Consolas" charset="0"/>
+                <a:sym typeface="Source Code Pro"/>
+              </a:rPr>
+              <a:t>account=</a:t>
+            </a:r>
+            <a:r>
+              <a:rPr lang="en" sz="1300" b="1" dirty="0" err="1">
+                <a:solidFill>
+                  <a:schemeClr val="dk1"/>
+                </a:solidFill>
+                <a:latin typeface="Consolas" charset="0"/>
+                <a:ea typeface="Consolas" charset="0"/>
+                <a:cs typeface="Consolas" charset="0"/>
+                <a:sym typeface="Source Code Pro"/>
+              </a:rPr>
+              <a:t>def-mludin</a:t>
+            </a:r>
+            <a:r>
+              <a:rPr lang="en" sz="1300" b="1" dirty="0">
+                <a:solidFill>
+                  <a:schemeClr val="dk1"/>
+                </a:solidFill>
+                <a:highlight>
+                  <a:srgbClr val="00FF00"/>
+                </a:highlight>
+                <a:latin typeface="Consolas" charset="0"/>
+                <a:ea typeface="Consolas" charset="0"/>
+                <a:cs typeface="Consolas" charset="0"/>
+                <a:sym typeface="Source Code Pro"/>
+              </a:rPr>
+              <a:t>&lt;ENTER&gt;</a:t>
+            </a:r>
+            <a:endParaRPr sz="1300" b="1" dirty="0">
               <a:solidFill>
                 <a:schemeClr val="dk1"/>
               </a:solidFill>
-              <a:latin typeface="Arial"/>
-              <a:ea typeface="Arial"/>
-              <a:cs typeface="Arial"/>
-              <a:sym typeface="Arial"/>
+              <a:highlight>
+                <a:srgbClr val="00FF00"/>
+              </a:highlight>
+              <a:latin typeface="Consolas" charset="0"/>
+              <a:ea typeface="Consolas" charset="0"/>
+              <a:cs typeface="Consolas" charset="0"/>
+              <a:sym typeface="Source Code Pro"/>
             </a:endParaRPr>
           </a:p>
           <a:p>
@@ -14959,196 +15528,7 @@
               </a:spcAft>
               <a:buNone/>
             </a:pPr>
-            <a:r>
-              <a:rPr lang="en" sz="1300" b="1">
-                <a:solidFill>
-                  <a:schemeClr val="dk1"/>
-                </a:solidFill>
-                <a:latin typeface="Source Code Pro"/>
-                <a:ea typeface="Source Code Pro"/>
-                <a:cs typeface="Source Code Pro"/>
-                <a:sym typeface="Source Code Pro"/>
-              </a:rPr>
-              <a:t>$ salloc</a:t>
-            </a:r>
-            <a:r>
-              <a:rPr lang="en" sz="1300" b="1">
-                <a:solidFill>
-                  <a:schemeClr val="dk1"/>
-                </a:solidFill>
-                <a:highlight>
-                  <a:srgbClr val="00FFFF"/>
-                </a:highlight>
-                <a:latin typeface="Source Code Pro"/>
-                <a:ea typeface="Source Code Pro"/>
-                <a:cs typeface="Source Code Pro"/>
-                <a:sym typeface="Source Code Pro"/>
-              </a:rPr>
-              <a:t> </a:t>
-            </a:r>
-            <a:r>
-              <a:rPr lang="en" sz="1300" b="1">
-                <a:solidFill>
-                  <a:schemeClr val="dk1"/>
-                </a:solidFill>
-                <a:latin typeface="Source Code Pro"/>
-                <a:ea typeface="Source Code Pro"/>
-                <a:cs typeface="Source Code Pro"/>
-                <a:sym typeface="Source Code Pro"/>
-              </a:rPr>
-              <a:t>--time=0:20:0</a:t>
-            </a:r>
-            <a:r>
-              <a:rPr lang="en" sz="1300" b="1">
-                <a:solidFill>
-                  <a:schemeClr val="dk1"/>
-                </a:solidFill>
-                <a:highlight>
-                  <a:srgbClr val="00FFFF"/>
-                </a:highlight>
-                <a:latin typeface="Source Code Pro"/>
-                <a:ea typeface="Source Code Pro"/>
-                <a:cs typeface="Source Code Pro"/>
-                <a:sym typeface="Source Code Pro"/>
-              </a:rPr>
-              <a:t> </a:t>
-            </a:r>
-            <a:r>
-              <a:rPr lang="en" sz="1300" b="1">
-                <a:solidFill>
-                  <a:schemeClr val="dk1"/>
-                </a:solidFill>
-                <a:latin typeface="Source Code Pro"/>
-                <a:ea typeface="Source Code Pro"/>
-                <a:cs typeface="Source Code Pro"/>
-                <a:sym typeface="Source Code Pro"/>
-              </a:rPr>
-              <a:t>--nodes=2</a:t>
-            </a:r>
-            <a:r>
-              <a:rPr lang="en" sz="1300" b="1">
-                <a:solidFill>
-                  <a:schemeClr val="dk1"/>
-                </a:solidFill>
-                <a:highlight>
-                  <a:srgbClr val="00FFFF"/>
-                </a:highlight>
-                <a:latin typeface="Source Code Pro"/>
-                <a:ea typeface="Source Code Pro"/>
-                <a:cs typeface="Source Code Pro"/>
-                <a:sym typeface="Source Code Pro"/>
-              </a:rPr>
-              <a:t> </a:t>
-            </a:r>
-            <a:r>
-              <a:rPr lang="en" sz="1300" b="1">
-                <a:solidFill>
-                  <a:schemeClr val="dk1"/>
-                </a:solidFill>
-                <a:latin typeface="Source Code Pro"/>
-                <a:ea typeface="Source Code Pro"/>
-                <a:cs typeface="Source Code Pro"/>
-                <a:sym typeface="Source Code Pro"/>
-              </a:rPr>
-              <a:t>--ntasks=64</a:t>
-            </a:r>
-            <a:r>
-              <a:rPr lang="en" sz="1300" b="1">
-                <a:solidFill>
-                  <a:schemeClr val="dk1"/>
-                </a:solidFill>
-                <a:highlight>
-                  <a:srgbClr val="00FFFF"/>
-                </a:highlight>
-                <a:latin typeface="Source Code Pro"/>
-                <a:ea typeface="Source Code Pro"/>
-                <a:cs typeface="Source Code Pro"/>
-                <a:sym typeface="Source Code Pro"/>
-              </a:rPr>
-              <a:t> </a:t>
-            </a:r>
-            <a:r>
-              <a:rPr lang="en" sz="1300" b="1">
-                <a:solidFill>
-                  <a:schemeClr val="dk1"/>
-                </a:solidFill>
-                <a:latin typeface="Source Code Pro"/>
-                <a:ea typeface="Source Code Pro"/>
-                <a:cs typeface="Source Code Pro"/>
-                <a:sym typeface="Source Code Pro"/>
-              </a:rPr>
-              <a:t>--cpus-per-task=1</a:t>
-            </a:r>
-            <a:r>
-              <a:rPr lang="en" sz="1300" b="1">
-                <a:solidFill>
-                  <a:schemeClr val="dk1"/>
-                </a:solidFill>
-                <a:highlight>
-                  <a:srgbClr val="00FFFF"/>
-                </a:highlight>
-                <a:latin typeface="Source Code Pro"/>
-                <a:ea typeface="Source Code Pro"/>
-                <a:cs typeface="Source Code Pro"/>
-                <a:sym typeface="Source Code Pro"/>
-              </a:rPr>
-              <a:t> </a:t>
-            </a:r>
-            <a:r>
-              <a:rPr lang="en" sz="1300" b="1">
-                <a:solidFill>
-                  <a:schemeClr val="dk1"/>
-                </a:solidFill>
-                <a:latin typeface="Source Code Pro"/>
-                <a:ea typeface="Source Code Pro"/>
-                <a:cs typeface="Source Code Pro"/>
-                <a:sym typeface="Source Code Pro"/>
-              </a:rPr>
-              <a:t>--mem-per-cpu=1GB</a:t>
-            </a:r>
-            <a:r>
-              <a:rPr lang="en" sz="1300" b="1">
-                <a:solidFill>
-                  <a:schemeClr val="dk1"/>
-                </a:solidFill>
-                <a:highlight>
-                  <a:srgbClr val="00FFFF"/>
-                </a:highlight>
-                <a:latin typeface="Source Code Pro"/>
-                <a:ea typeface="Source Code Pro"/>
-                <a:cs typeface="Source Code Pro"/>
-                <a:sym typeface="Source Code Pro"/>
-              </a:rPr>
-              <a:t>  </a:t>
-            </a:r>
-            <a:r>
-              <a:rPr lang="en" sz="1300" b="1">
-                <a:solidFill>
-                  <a:schemeClr val="dk1"/>
-                </a:solidFill>
-                <a:latin typeface="Source Code Pro"/>
-                <a:ea typeface="Source Code Pro"/>
-                <a:cs typeface="Source Code Pro"/>
-                <a:sym typeface="Source Code Pro"/>
-              </a:rPr>
-              <a:t>--account=def-mludin</a:t>
-            </a:r>
-            <a:r>
-              <a:rPr lang="en" sz="1300" b="1">
-                <a:solidFill>
-                  <a:schemeClr val="dk1"/>
-                </a:solidFill>
-                <a:highlight>
-                  <a:srgbClr val="00FF00"/>
-                </a:highlight>
-                <a:latin typeface="Source Code Pro"/>
-                <a:ea typeface="Source Code Pro"/>
-                <a:cs typeface="Source Code Pro"/>
-                <a:sym typeface="Source Code Pro"/>
-              </a:rPr>
-              <a:t>&lt;ENTER&gt;</a:t>
-            </a:r>
-            <a:endParaRPr sz="1300" b="1">
+            <a:endParaRPr sz="1300" b="1" dirty="0">
               <a:solidFill>
                 <a:schemeClr val="dk1"/>
               </a:solidFill>
@@ -15171,31 +15551,8 @@
               </a:spcAft>
               <a:buNone/>
             </a:pPr>
-            <a:endParaRPr sz="1300" b="1">
-              <a:solidFill>
-                <a:schemeClr val="dk1"/>
-              </a:solidFill>
-              <a:highlight>
-                <a:srgbClr val="00FF00"/>
-              </a:highlight>
-              <a:latin typeface="Source Code Pro"/>
-              <a:ea typeface="Source Code Pro"/>
-              <a:cs typeface="Source Code Pro"/>
-              <a:sym typeface="Source Code Pro"/>
-            </a:endParaRPr>
-          </a:p>
-          <a:p>
-            <a:pPr marL="0" lvl="0" indent="0" algn="l" rtl="0">
-              <a:spcBef>
-                <a:spcPts val="0"/>
-              </a:spcBef>
-              <a:spcAft>
-                <a:spcPts val="0"/>
-              </a:spcAft>
-              <a:buNone/>
-            </a:pPr>
-            <a:r>
-              <a:rPr lang="en" sz="1350" b="1">
+            <a:r>
+              <a:rPr lang="en" sz="1350" b="1" dirty="0">
                 <a:latin typeface="Consolas"/>
                 <a:ea typeface="Consolas"/>
                 <a:cs typeface="Consolas"/>
@@ -15203,7 +15560,7 @@
               </a:rPr>
               <a:t>OUTPUT:</a:t>
             </a:r>
-            <a:endParaRPr sz="1350" b="1">
+            <a:endParaRPr sz="1350" b="1" dirty="0">
               <a:latin typeface="Consolas"/>
               <a:ea typeface="Consolas"/>
               <a:cs typeface="Consolas"/>
@@ -15221,15 +15578,114 @@
               <a:buNone/>
             </a:pPr>
             <a:r>
-              <a:rPr lang="en" sz="1150">
+              <a:rPr lang="en" sz="1150" dirty="0">
                 <a:latin typeface="Consolas"/>
                 <a:ea typeface="Consolas"/>
                 <a:cs typeface="Consolas"/>
                 <a:sym typeface="Consolas"/>
               </a:rPr>
-              <a:t>[mludin@cedar1 bw_capstone]$ salloc --time=0:20:0 --nodes=2 --ntasks=64 --cpus-per-task=1 --mem-per-cpu=1GB --account=def-mludin</a:t>
-            </a:r>
-            <a:endParaRPr sz="1150">
+              <a:t>[mludin@cedar1 </a:t>
+            </a:r>
+            <a:r>
+              <a:rPr lang="en" sz="1150" dirty="0" err="1">
+                <a:latin typeface="Consolas"/>
+                <a:ea typeface="Consolas"/>
+                <a:cs typeface="Consolas"/>
+                <a:sym typeface="Consolas"/>
+              </a:rPr>
+              <a:t>bw_capstone</a:t>
+            </a:r>
+            <a:r>
+              <a:rPr lang="en" sz="1150" dirty="0">
+                <a:latin typeface="Consolas"/>
+                <a:ea typeface="Consolas"/>
+                <a:cs typeface="Consolas"/>
+                <a:sym typeface="Consolas"/>
+              </a:rPr>
+              <a:t>]$ </a:t>
+            </a:r>
+            <a:r>
+              <a:rPr lang="en" sz="1150" dirty="0" err="1">
+                <a:latin typeface="Consolas"/>
+                <a:ea typeface="Consolas"/>
+                <a:cs typeface="Consolas"/>
+                <a:sym typeface="Consolas"/>
+              </a:rPr>
+              <a:t>salloc</a:t>
+            </a:r>
+            <a:r>
+              <a:rPr lang="en" sz="1150" dirty="0">
+                <a:latin typeface="Consolas"/>
+                <a:ea typeface="Consolas"/>
+                <a:cs typeface="Consolas"/>
+                <a:sym typeface="Consolas"/>
+              </a:rPr>
+              <a:t> --time=0:20:0 --nodes=2 --</a:t>
+            </a:r>
+            <a:r>
+              <a:rPr lang="en" sz="1150" dirty="0" err="1">
+                <a:latin typeface="Consolas"/>
+                <a:ea typeface="Consolas"/>
+                <a:cs typeface="Consolas"/>
+                <a:sym typeface="Consolas"/>
+              </a:rPr>
+              <a:t>ntasks</a:t>
+            </a:r>
+            <a:r>
+              <a:rPr lang="en" sz="1150" dirty="0">
+                <a:latin typeface="Consolas"/>
+                <a:ea typeface="Consolas"/>
+                <a:cs typeface="Consolas"/>
+                <a:sym typeface="Consolas"/>
+              </a:rPr>
+              <a:t>=64 --</a:t>
+            </a:r>
+            <a:r>
+              <a:rPr lang="en" sz="1150" dirty="0" err="1">
+                <a:latin typeface="Consolas"/>
+                <a:ea typeface="Consolas"/>
+                <a:cs typeface="Consolas"/>
+                <a:sym typeface="Consolas"/>
+              </a:rPr>
+              <a:t>cpus</a:t>
+            </a:r>
+            <a:r>
+              <a:rPr lang="en" sz="1150" dirty="0">
+                <a:latin typeface="Consolas"/>
+                <a:ea typeface="Consolas"/>
+                <a:cs typeface="Consolas"/>
+                <a:sym typeface="Consolas"/>
+              </a:rPr>
+              <a:t>-per-task=1 --mem-per-</a:t>
+            </a:r>
+            <a:r>
+              <a:rPr lang="en" sz="1150" dirty="0" err="1">
+                <a:latin typeface="Consolas"/>
+                <a:ea typeface="Consolas"/>
+                <a:cs typeface="Consolas"/>
+                <a:sym typeface="Consolas"/>
+              </a:rPr>
+              <a:t>cpu</a:t>
+            </a:r>
+            <a:r>
+              <a:rPr lang="en" sz="1150" dirty="0">
+                <a:latin typeface="Consolas"/>
+                <a:ea typeface="Consolas"/>
+                <a:cs typeface="Consolas"/>
+                <a:sym typeface="Consolas"/>
+              </a:rPr>
+              <a:t>=1GB --account=</a:t>
+            </a:r>
+            <a:r>
+              <a:rPr lang="en" sz="1150" dirty="0" err="1">
+                <a:latin typeface="Consolas"/>
+                <a:ea typeface="Consolas"/>
+                <a:cs typeface="Consolas"/>
+                <a:sym typeface="Consolas"/>
+              </a:rPr>
+              <a:t>def-mludin</a:t>
+            </a:r>
+            <a:endParaRPr sz="1150" dirty="0">
               <a:latin typeface="Consolas"/>
               <a:ea typeface="Consolas"/>
               <a:cs typeface="Consolas"/>
@@ -15247,15 +15703,24 @@
               <a:buNone/>
             </a:pPr>
             <a:r>
-              <a:rPr lang="en" sz="1150">
+              <a:rPr lang="en" sz="1150" dirty="0" err="1">
                 <a:latin typeface="Consolas"/>
                 <a:ea typeface="Consolas"/>
                 <a:cs typeface="Consolas"/>
                 <a:sym typeface="Consolas"/>
               </a:rPr>
-              <a:t>salloc: Granted job allocation 45535851</a:t>
-            </a:r>
-            <a:endParaRPr sz="1150">
+              <a:t>salloc</a:t>
+            </a:r>
+            <a:r>
+              <a:rPr lang="en" sz="1150" dirty="0">
+                <a:latin typeface="Consolas"/>
+                <a:ea typeface="Consolas"/>
+                <a:cs typeface="Consolas"/>
+                <a:sym typeface="Consolas"/>
+              </a:rPr>
+              <a:t>: Granted job allocation 45535851</a:t>
+            </a:r>
+            <a:endParaRPr sz="1150" dirty="0">
               <a:latin typeface="Consolas"/>
               <a:ea typeface="Consolas"/>
               <a:cs typeface="Consolas"/>
@@ -15273,15 +15738,24 @@
               <a:buNone/>
             </a:pPr>
             <a:r>
-              <a:rPr lang="en" sz="1150">
+              <a:rPr lang="en" sz="1150" dirty="0" err="1">
                 <a:latin typeface="Consolas"/>
                 <a:ea typeface="Consolas"/>
                 <a:cs typeface="Consolas"/>
                 <a:sym typeface="Consolas"/>
               </a:rPr>
-              <a:t>salloc: Waiting for resource configuration</a:t>
-            </a:r>
-            <a:endParaRPr sz="1150">
+              <a:t>salloc</a:t>
+            </a:r>
+            <a:r>
+              <a:rPr lang="en" sz="1150" dirty="0">
+                <a:latin typeface="Consolas"/>
+                <a:ea typeface="Consolas"/>
+                <a:cs typeface="Consolas"/>
+                <a:sym typeface="Consolas"/>
+              </a:rPr>
+              <a:t>: Waiting for resource configuration</a:t>
+            </a:r>
+            <a:endParaRPr sz="1150" dirty="0">
               <a:latin typeface="Consolas"/>
               <a:ea typeface="Consolas"/>
               <a:cs typeface="Consolas"/>
@@ -15299,16 +15773,43 @@
               <a:buNone/>
             </a:pPr>
             <a:r>
-              <a:rPr lang="en" sz="1150">
+              <a:rPr lang="en" sz="1150" dirty="0" err="1">
                 <a:latin typeface="Consolas"/>
                 <a:ea typeface="Consolas"/>
                 <a:cs typeface="Consolas"/>
                 <a:sym typeface="Consolas"/>
               </a:rPr>
-              <a:t>salloc: Nodes cdr[</a:t>
-            </a:r>
-            <a:r>
-              <a:rPr lang="en" sz="1150">
+              <a:t>salloc</a:t>
+            </a:r>
+            <a:r>
+              <a:rPr lang="en" sz="1150" dirty="0">
+                <a:latin typeface="Consolas"/>
+                <a:ea typeface="Consolas"/>
+                <a:cs typeface="Consolas"/>
+                <a:sym typeface="Consolas"/>
+              </a:rPr>
+              <a:t>: Nodes </a:t>
+            </a:r>
+            <a:r>
+              <a:rPr lang="en" sz="1150" dirty="0" err="1">
+                <a:latin typeface="Consolas"/>
+                <a:ea typeface="Consolas"/>
+                <a:cs typeface="Consolas"/>
+                <a:sym typeface="Consolas"/>
+              </a:rPr>
+              <a:t>cdr</a:t>
+            </a:r>
+            <a:r>
+              <a:rPr lang="en" sz="1150" dirty="0">
+                <a:latin typeface="Consolas"/>
+                <a:ea typeface="Consolas"/>
+                <a:cs typeface="Consolas"/>
+                <a:sym typeface="Consolas"/>
+              </a:rPr>
+              <a:t>[</a:t>
+            </a:r>
+            <a:r>
+              <a:rPr lang="en" sz="1150" dirty="0">
                 <a:highlight>
                   <a:srgbClr val="B6D7A8"/>
                 </a:highlight>
@@ -15320,7 +15821,7 @@
               <a:t>768,774</a:t>
             </a:r>
             <a:r>
-              <a:rPr lang="en" sz="1150">
+              <a:rPr lang="en" sz="1150" dirty="0">
                 <a:latin typeface="Consolas"/>
                 <a:ea typeface="Consolas"/>
                 <a:cs typeface="Consolas"/>
@@ -15328,7 +15829,7 @@
               </a:rPr>
               <a:t>] are ready for job</a:t>
             </a:r>
-            <a:endParaRPr sz="1150">
+            <a:endParaRPr sz="1150" dirty="0">
               <a:latin typeface="Consolas"/>
               <a:ea typeface="Consolas"/>
               <a:cs typeface="Consolas"/>
@@ -15345,7 +15846,7 @@
               </a:spcAft>
               <a:buNone/>
             </a:pPr>
-            <a:endParaRPr sz="1150">
+            <a:endParaRPr sz="1150" dirty="0">
               <a:latin typeface="Consolas"/>
               <a:ea typeface="Consolas"/>
               <a:cs typeface="Consolas"/>
@@ -15367,7 +15868,7 @@
               <a:buFont typeface="Arial"/>
               <a:buNone/>
             </a:pPr>
-            <a:endParaRPr sz="1050">
+            <a:endParaRPr sz="1050" dirty="0">
               <a:latin typeface="Consolas"/>
               <a:ea typeface="Consolas"/>
               <a:cs typeface="Consolas"/>
@@ -15384,7 +15885,7 @@
               </a:spcAft>
               <a:buNone/>
             </a:pPr>
-            <a:endParaRPr/>
+            <a:endParaRPr dirty="0"/>
           </a:p>
           <a:p>
             <a:pPr marL="0" lvl="0" indent="0" algn="l" rtl="0">
@@ -15396,7 +15897,7 @@
               </a:spcAft>
               <a:buNone/>
             </a:pPr>
-            <a:endParaRPr/>
+            <a:endParaRPr dirty="0"/>
           </a:p>
           <a:p>
             <a:pPr marL="0" lvl="0" indent="0" algn="l" rtl="0">
@@ -15408,7 +15909,7 @@
               </a:spcAft>
               <a:buNone/>
             </a:pPr>
-            <a:endParaRPr/>
+            <a:endParaRPr dirty="0"/>
           </a:p>
           <a:p>
             <a:pPr marL="457200" lvl="0" indent="0" algn="l" rtl="0">
@@ -15420,7 +15921,7 @@
               </a:spcAft>
               <a:buNone/>
             </a:pPr>
-            <a:endParaRPr/>
+            <a:endParaRPr dirty="0"/>
           </a:p>
         </p:txBody>
       </p:sp>
@@ -16355,7 +16856,7 @@
               <a:buNone/>
             </a:pPr>
             <a:r>
-              <a:rPr lang="en" sz="1200" b="1">
+              <a:rPr lang="en" sz="1200" b="1" dirty="0">
                 <a:solidFill>
                   <a:srgbClr val="0000FF"/>
                 </a:solidFill>
@@ -16364,9 +16865,45 @@
                 <a:cs typeface="Consolas"/>
                 <a:sym typeface="Consolas"/>
               </a:rPr>
-              <a:t>[ acc_laplace.c ]</a:t>
-            </a:r>
-            <a:endParaRPr sz="1200" b="1">
+              <a:t>[ </a:t>
+            </a:r>
+            <a:r>
+              <a:rPr lang="en-US" sz="1200" b="1" dirty="0" smtClean="0">
+                <a:solidFill>
+                  <a:srgbClr val="0000FF"/>
+                </a:solidFill>
+                <a:latin typeface="Consolas"/>
+                <a:ea typeface="Consolas"/>
+                <a:cs typeface="Consolas"/>
+                <a:sym typeface="Consolas"/>
+              </a:rPr>
+              <a:t>diffusion</a:t>
+            </a:r>
+            <a:r>
+              <a:rPr lang="en" sz="1200" b="1" dirty="0" smtClean="0">
+                <a:solidFill>
+                  <a:srgbClr val="0000FF"/>
+                </a:solidFill>
+                <a:latin typeface="Consolas"/>
+                <a:ea typeface="Consolas"/>
+                <a:cs typeface="Consolas"/>
+                <a:sym typeface="Consolas"/>
+              </a:rPr>
+              <a:t>.c </a:t>
+            </a:r>
+            <a:r>
+              <a:rPr lang="en" sz="1200" b="1" dirty="0">
+                <a:solidFill>
+                  <a:srgbClr val="0000FF"/>
+                </a:solidFill>
+                <a:latin typeface="Consolas"/>
+                <a:ea typeface="Consolas"/>
+                <a:cs typeface="Consolas"/>
+                <a:sym typeface="Consolas"/>
+              </a:rPr>
+              <a:t>]</a:t>
+            </a:r>
+            <a:endParaRPr sz="1200" b="1" dirty="0">
               <a:solidFill>
                 <a:schemeClr val="dk1"/>
               </a:solidFill>
@@ -16388,7 +16925,7 @@
               <a:buNone/>
             </a:pPr>
             <a:r>
-              <a:rPr lang="en" sz="1200" b="1">
+              <a:rPr lang="en" sz="1200" b="1" dirty="0">
                 <a:solidFill>
                   <a:schemeClr val="dk1"/>
                 </a:solidFill>
@@ -16400,7 +16937,7 @@
               <a:t>	</a:t>
             </a:r>
             <a:r>
-              <a:rPr lang="en" sz="1200">
+              <a:rPr lang="en" sz="1200" dirty="0">
                 <a:solidFill>
                   <a:schemeClr val="dk1"/>
                 </a:solidFill>
@@ -16409,9 +16946,33 @@
                 <a:cs typeface="Consolas"/>
                 <a:sym typeface="Consolas"/>
               </a:rPr>
-              <a:t>$ less acc_laplace.c</a:t>
-            </a:r>
-            <a:endParaRPr sz="1200" b="1">
+              <a:t>$ less </a:t>
+            </a:r>
+            <a:r>
+              <a:rPr lang="en-US" sz="1200" dirty="0" smtClean="0">
+                <a:solidFill>
+                  <a:schemeClr val="dk1"/>
+                </a:solidFill>
+                <a:latin typeface="Consolas"/>
+                <a:ea typeface="Consolas"/>
+                <a:cs typeface="Consolas"/>
+                <a:sym typeface="Consolas"/>
+              </a:rPr>
+              <a:t>diffusion</a:t>
+            </a:r>
+            <a:r>
+              <a:rPr lang="en" sz="1200" dirty="0" smtClean="0">
+                <a:solidFill>
+                  <a:schemeClr val="dk1"/>
+                </a:solidFill>
+                <a:latin typeface="Consolas"/>
+                <a:ea typeface="Consolas"/>
+                <a:cs typeface="Consolas"/>
+                <a:sym typeface="Consolas"/>
+              </a:rPr>
+              <a:t>.c</a:t>
+            </a:r>
+            <a:endParaRPr sz="1200" b="1" dirty="0">
               <a:solidFill>
                 <a:schemeClr val="dk1"/>
               </a:solidFill>
@@ -16433,14 +16994,14 @@
               <a:buNone/>
             </a:pPr>
             <a:r>
-              <a:rPr lang="en" sz="1200" b="1">
+              <a:rPr lang="en" sz="1200" b="1" dirty="0">
                 <a:solidFill>
                   <a:schemeClr val="dk1"/>
                 </a:solidFill>
               </a:rPr>
               <a:t>How to compile:</a:t>
             </a:r>
-            <a:endParaRPr sz="1200" b="1">
+            <a:endParaRPr sz="1200" b="1" dirty="0">
               <a:solidFill>
                 <a:schemeClr val="dk1"/>
               </a:solidFill>
@@ -16462,7 +17023,7 @@
               <a:buNone/>
             </a:pPr>
             <a:r>
-              <a:rPr lang="en" sz="1200" b="1">
+              <a:rPr lang="en" sz="1200" b="1" dirty="0">
                 <a:solidFill>
                   <a:schemeClr val="dk1"/>
                 </a:solidFill>
@@ -16470,7 +17031,7 @@
               <a:t>	</a:t>
             </a:r>
             <a:r>
-              <a:rPr lang="en" sz="1200">
+              <a:rPr lang="en" sz="1200" dirty="0">
                 <a:solidFill>
                   <a:schemeClr val="dk1"/>
                 </a:solidFill>
@@ -16479,9 +17040,21 @@
                 <a:cs typeface="Consolas"/>
                 <a:sym typeface="Consolas"/>
               </a:rPr>
-              <a:t>$ make acc_laplace</a:t>
-            </a:r>
-            <a:endParaRPr sz="1200" b="1">
+              <a:t>$ make </a:t>
+            </a:r>
+            <a:r>
+              <a:rPr lang="en-US" sz="1200" dirty="0" smtClean="0">
+                <a:solidFill>
+                  <a:schemeClr val="dk1"/>
+                </a:solidFill>
+                <a:latin typeface="Consolas"/>
+                <a:ea typeface="Consolas"/>
+                <a:cs typeface="Consolas"/>
+                <a:sym typeface="Consolas"/>
+              </a:rPr>
+              <a:t>diffusion</a:t>
+            </a:r>
+            <a:endParaRPr sz="1200" b="1" dirty="0">
               <a:solidFill>
                 <a:schemeClr val="dk1"/>
               </a:solidFill>
@@ -16503,14 +17076,14 @@
               <a:buNone/>
             </a:pPr>
             <a:r>
-              <a:rPr lang="en" sz="1200" b="1">
+              <a:rPr lang="en" sz="1200" b="1" dirty="0">
                 <a:solidFill>
                   <a:schemeClr val="dk1"/>
                 </a:solidFill>
               </a:rPr>
               <a:t>How to run:</a:t>
             </a:r>
-            <a:endParaRPr sz="1200">
+            <a:endParaRPr sz="1200" dirty="0">
               <a:solidFill>
                 <a:schemeClr val="dk1"/>
               </a:solidFill>
@@ -16536,7 +17109,7 @@
               <a:buNone/>
             </a:pPr>
             <a:r>
-              <a:rPr lang="en" sz="1200" b="1">
+              <a:rPr lang="en" sz="1200" b="1" dirty="0">
                 <a:solidFill>
                   <a:schemeClr val="dk1"/>
                 </a:solidFill>
@@ -16544,7 +17117,7 @@
               <a:t>	</a:t>
             </a:r>
             <a:r>
-              <a:rPr lang="en" sz="1200">
+              <a:rPr lang="en" sz="1200" dirty="0">
                 <a:solidFill>
                   <a:schemeClr val="dk1"/>
                 </a:solidFill>
@@ -16553,9 +17126,69 @@
                 <a:cs typeface="Consolas"/>
                 <a:sym typeface="Consolas"/>
               </a:rPr>
-              <a:t>$ srun ./acc_laplace.exe</a:t>
-            </a:r>
-            <a:endParaRPr sz="1200" b="1">
+              <a:t>$ </a:t>
+            </a:r>
+            <a:r>
+              <a:rPr lang="en" sz="1200" dirty="0" err="1">
+                <a:solidFill>
+                  <a:schemeClr val="dk1"/>
+                </a:solidFill>
+                <a:latin typeface="Consolas"/>
+                <a:ea typeface="Consolas"/>
+                <a:cs typeface="Consolas"/>
+                <a:sym typeface="Consolas"/>
+              </a:rPr>
+              <a:t>srun</a:t>
+            </a:r>
+            <a:r>
+              <a:rPr lang="en" sz="1200" dirty="0">
+                <a:solidFill>
+                  <a:schemeClr val="dk1"/>
+                </a:solidFill>
+                <a:latin typeface="Consolas"/>
+                <a:ea typeface="Consolas"/>
+                <a:cs typeface="Consolas"/>
+                <a:sym typeface="Consolas"/>
+              </a:rPr>
+              <a:t> </a:t>
+            </a:r>
+            <a:r>
+              <a:rPr lang="en" sz="1200" dirty="0" smtClean="0">
+                <a:solidFill>
+                  <a:schemeClr val="dk1"/>
+                </a:solidFill>
+                <a:latin typeface="Consolas"/>
+                <a:ea typeface="Consolas"/>
+                <a:cs typeface="Consolas"/>
+                <a:sym typeface="Consolas"/>
+              </a:rPr>
+              <a:t>./</a:t>
+            </a:r>
+            <a:r>
+              <a:rPr lang="en-US" sz="1200" dirty="0" smtClean="0">
+                <a:solidFill>
+                  <a:schemeClr val="dk1"/>
+                </a:solidFill>
+                <a:latin typeface="Consolas"/>
+                <a:ea typeface="Consolas"/>
+                <a:cs typeface="Consolas"/>
+                <a:sym typeface="Consolas"/>
+              </a:rPr>
+              <a:t>diffusion</a:t>
+            </a:r>
+            <a:r>
+              <a:rPr lang="en" sz="1200" dirty="0" smtClean="0">
+                <a:solidFill>
+                  <a:schemeClr val="dk1"/>
+                </a:solidFill>
+                <a:latin typeface="Consolas"/>
+                <a:ea typeface="Consolas"/>
+                <a:cs typeface="Consolas"/>
+                <a:sym typeface="Consolas"/>
+              </a:rPr>
+              <a:t>.exe</a:t>
+            </a:r>
+            <a:endParaRPr sz="1200" b="1" dirty="0">
               <a:solidFill>
                 <a:schemeClr val="dk1"/>
               </a:solidFill>
@@ -16580,7 +17213,7 @@
               <a:buFont typeface="Arial"/>
               <a:buNone/>
             </a:pPr>
-            <a:endParaRPr sz="1200">
+            <a:endParaRPr sz="1200" dirty="0">
               <a:solidFill>
                 <a:schemeClr val="dk1"/>
               </a:solidFill>
@@ -16606,7 +17239,7 @@
               <a:buNone/>
             </a:pPr>
             <a:r>
-              <a:rPr lang="en" sz="1200">
+              <a:rPr lang="en" sz="1200" dirty="0">
                 <a:solidFill>
                   <a:schemeClr val="dk1"/>
                 </a:solidFill>
@@ -16617,7 +17250,7 @@
               </a:rPr>
               <a:t>#!/bin/bash</a:t>
             </a:r>
-            <a:endParaRPr sz="1200">
+            <a:endParaRPr sz="1200" dirty="0">
               <a:solidFill>
                 <a:schemeClr val="dk1"/>
               </a:solidFill>
@@ -16643,7 +17276,7 @@
               <a:buNone/>
             </a:pPr>
             <a:r>
-              <a:rPr lang="en" sz="1200">
+              <a:rPr lang="en" sz="1200" dirty="0">
                 <a:solidFill>
                   <a:schemeClr val="dk1"/>
                 </a:solidFill>
@@ -16652,9 +17285,33 @@
                 <a:cs typeface="Consolas"/>
                 <a:sym typeface="Consolas"/>
               </a:rPr>
-              <a:t>#SBATCH --account=def-someuser            </a:t>
-            </a:r>
-            <a:endParaRPr sz="1200">
+              <a:t>#SBATCH --</a:t>
+            </a:r>
+            <a:r>
+              <a:rPr lang="en" sz="1200" dirty="0" smtClean="0">
+                <a:solidFill>
+                  <a:schemeClr val="dk1"/>
+                </a:solidFill>
+                <a:latin typeface="Consolas"/>
+                <a:ea typeface="Consolas"/>
+                <a:cs typeface="Consolas"/>
+                <a:sym typeface="Consolas"/>
+              </a:rPr>
+              <a:t>account=</a:t>
+            </a:r>
+            <a:r>
+              <a:rPr lang="en" sz="1200" dirty="0" err="1" smtClean="0">
+                <a:solidFill>
+                  <a:schemeClr val="dk1"/>
+                </a:solidFill>
+                <a:latin typeface="Consolas"/>
+                <a:ea typeface="Consolas"/>
+                <a:cs typeface="Consolas"/>
+                <a:sym typeface="Consolas"/>
+              </a:rPr>
+              <a:t>def-someuser</a:t>
+            </a:r>
+            <a:endParaRPr lang="en-US" sz="1200" dirty="0" smtClean="0">
               <a:solidFill>
                 <a:schemeClr val="dk1"/>
               </a:solidFill>
@@ -16680,7 +17337,7 @@
               <a:buNone/>
             </a:pPr>
             <a:r>
-              <a:rPr lang="en" sz="1200">
+              <a:rPr lang="en" sz="1200" dirty="0" smtClean="0">
                 <a:solidFill>
                   <a:schemeClr val="dk1"/>
                 </a:solidFill>
@@ -16689,9 +17346,21 @@
                 <a:cs typeface="Consolas"/>
                 <a:sym typeface="Consolas"/>
               </a:rPr>
-              <a:t>#SBATCH --job-name=acc_laplace          </a:t>
-            </a:r>
-            <a:endParaRPr sz="1200">
+              <a:t>#SBATCH --job-name=</a:t>
+            </a:r>
+            <a:r>
+              <a:rPr lang="en-US" sz="1200" dirty="0" smtClean="0">
+                <a:solidFill>
+                  <a:schemeClr val="dk1"/>
+                </a:solidFill>
+                <a:latin typeface="Consolas"/>
+                <a:ea typeface="Consolas"/>
+                <a:cs typeface="Consolas"/>
+                <a:sym typeface="Consolas"/>
+              </a:rPr>
+              <a:t>diffusion</a:t>
+            </a:r>
+            <a:endParaRPr sz="1200" dirty="0">
               <a:solidFill>
                 <a:schemeClr val="dk1"/>
               </a:solidFill>
@@ -16717,7 +17386,7 @@
               <a:buNone/>
             </a:pPr>
             <a:r>
-              <a:rPr lang="en" sz="1200">
+              <a:rPr lang="en" sz="1200" dirty="0">
                 <a:solidFill>
                   <a:schemeClr val="dk1"/>
                 </a:solidFill>
@@ -16726,9 +17395,33 @@
                 <a:cs typeface="Consolas"/>
                 <a:sym typeface="Consolas"/>
               </a:rPr>
-              <a:t>#SBATCH --gres=gpu:p100:1               </a:t>
-            </a:r>
-            <a:endParaRPr sz="1200">
+              <a:t>#SBATCH --</a:t>
+            </a:r>
+            <a:r>
+              <a:rPr lang="en" sz="1200" dirty="0" err="1" smtClean="0">
+                <a:solidFill>
+                  <a:schemeClr val="dk1"/>
+                </a:solidFill>
+                <a:latin typeface="Consolas"/>
+                <a:ea typeface="Consolas"/>
+                <a:cs typeface="Consolas"/>
+                <a:sym typeface="Consolas"/>
+              </a:rPr>
+              <a:t>gres</a:t>
+            </a:r>
+            <a:r>
+              <a:rPr lang="en" sz="1200" dirty="0" smtClean="0">
+                <a:solidFill>
+                  <a:schemeClr val="dk1"/>
+                </a:solidFill>
+                <a:latin typeface="Consolas"/>
+                <a:ea typeface="Consolas"/>
+                <a:cs typeface="Consolas"/>
+                <a:sym typeface="Consolas"/>
+              </a:rPr>
+              <a:t>=gpu:p100:1</a:t>
+            </a:r>
+            <a:endParaRPr lang="en-US" sz="1200" dirty="0" smtClean="0">
               <a:solidFill>
                 <a:schemeClr val="dk1"/>
               </a:solidFill>
@@ -16754,7 +17447,7 @@
               <a:buNone/>
             </a:pPr>
             <a:r>
-              <a:rPr lang="en" sz="1200">
+              <a:rPr lang="en" sz="1200" dirty="0" smtClean="0">
                 <a:solidFill>
                   <a:schemeClr val="dk1"/>
                 </a:solidFill>
@@ -16763,9 +17456,33 @@
                 <a:cs typeface="Consolas"/>
                 <a:sym typeface="Consolas"/>
               </a:rPr>
-              <a:t>#SBATCH --nodes=1                       </a:t>
-            </a:r>
-            <a:endParaRPr sz="1200">
+              <a:t>#SBATCH </a:t>
+            </a:r>
+            <a:r>
+              <a:rPr lang="en" sz="1200" dirty="0">
+                <a:solidFill>
+                  <a:schemeClr val="dk1"/>
+                </a:solidFill>
+                <a:latin typeface="Consolas"/>
+                <a:ea typeface="Consolas"/>
+                <a:cs typeface="Consolas"/>
+                <a:sym typeface="Consolas"/>
+              </a:rPr>
+              <a:t>--</a:t>
+            </a:r>
+            <a:r>
+              <a:rPr lang="en" sz="1200" dirty="0" smtClean="0">
+                <a:solidFill>
+                  <a:schemeClr val="dk1"/>
+                </a:solidFill>
+                <a:latin typeface="Consolas"/>
+                <a:ea typeface="Consolas"/>
+                <a:cs typeface="Consolas"/>
+                <a:sym typeface="Consolas"/>
+              </a:rPr>
+              <a:t>nodes=1</a:t>
+            </a:r>
+            <a:endParaRPr lang="en-US" sz="1200" dirty="0" smtClean="0">
               <a:solidFill>
                 <a:schemeClr val="dk1"/>
               </a:solidFill>
@@ -16791,7 +17508,7 @@
               <a:buNone/>
             </a:pPr>
             <a:r>
-              <a:rPr lang="en" sz="1200">
+              <a:rPr lang="en" sz="1200" dirty="0" smtClean="0">
                 <a:solidFill>
                   <a:schemeClr val="dk1"/>
                 </a:solidFill>
@@ -16800,9 +17517,45 @@
                 <a:cs typeface="Consolas"/>
                 <a:sym typeface="Consolas"/>
               </a:rPr>
-              <a:t>#SBATCH --ntasks=1                      </a:t>
-            </a:r>
-            <a:endParaRPr sz="1200">
+              <a:t>#SBATCH </a:t>
+            </a:r>
+            <a:r>
+              <a:rPr lang="en" sz="1200" dirty="0">
+                <a:solidFill>
+                  <a:schemeClr val="dk1"/>
+                </a:solidFill>
+                <a:latin typeface="Consolas"/>
+                <a:ea typeface="Consolas"/>
+                <a:cs typeface="Consolas"/>
+                <a:sym typeface="Consolas"/>
+              </a:rPr>
+              <a:t>--</a:t>
+            </a:r>
+            <a:r>
+              <a:rPr lang="en" sz="1200" dirty="0" err="1" smtClean="0">
+                <a:solidFill>
+                  <a:schemeClr val="dk1"/>
+                </a:solidFill>
+                <a:latin typeface="Consolas"/>
+                <a:ea typeface="Consolas"/>
+                <a:cs typeface="Consolas"/>
+                <a:sym typeface="Consolas"/>
+              </a:rPr>
+              <a:t>ntasks</a:t>
+            </a:r>
+            <a:r>
+              <a:rPr lang="en" sz="1200" dirty="0" smtClean="0">
+                <a:solidFill>
+                  <a:schemeClr val="dk1"/>
+                </a:solidFill>
+                <a:latin typeface="Consolas"/>
+                <a:ea typeface="Consolas"/>
+                <a:cs typeface="Consolas"/>
+                <a:sym typeface="Consolas"/>
+              </a:rPr>
+              <a:t>=1</a:t>
+            </a:r>
+            <a:endParaRPr sz="1200" dirty="0">
               <a:solidFill>
                 <a:schemeClr val="dk1"/>
               </a:solidFill>
@@ -16828,7 +17581,7 @@
               <a:buNone/>
             </a:pPr>
             <a:r>
-              <a:rPr lang="en" sz="1200">
+              <a:rPr lang="en" sz="1200" dirty="0">
                 <a:solidFill>
                   <a:schemeClr val="dk1"/>
                 </a:solidFill>
@@ -16837,9 +17590,33 @@
                 <a:cs typeface="Consolas"/>
                 <a:sym typeface="Consolas"/>
               </a:rPr>
-              <a:t>#SBATCH --cpus-per-task=1               </a:t>
-            </a:r>
-            <a:endParaRPr sz="1200">
+              <a:t>#SBATCH --</a:t>
+            </a:r>
+            <a:r>
+              <a:rPr lang="en" sz="1200" dirty="0" err="1" smtClean="0">
+                <a:solidFill>
+                  <a:schemeClr val="dk1"/>
+                </a:solidFill>
+                <a:latin typeface="Consolas"/>
+                <a:ea typeface="Consolas"/>
+                <a:cs typeface="Consolas"/>
+                <a:sym typeface="Consolas"/>
+              </a:rPr>
+              <a:t>cpus</a:t>
+            </a:r>
+            <a:r>
+              <a:rPr lang="en" sz="1200" dirty="0" smtClean="0">
+                <a:solidFill>
+                  <a:schemeClr val="dk1"/>
+                </a:solidFill>
+                <a:latin typeface="Consolas"/>
+                <a:ea typeface="Consolas"/>
+                <a:cs typeface="Consolas"/>
+                <a:sym typeface="Consolas"/>
+              </a:rPr>
+              <a:t>-per-task=1</a:t>
+            </a:r>
+            <a:endParaRPr sz="1200" dirty="0">
               <a:solidFill>
                 <a:schemeClr val="dk1"/>
               </a:solidFill>
@@ -16865,7 +17642,7 @@
               <a:buNone/>
             </a:pPr>
             <a:r>
-              <a:rPr lang="en" sz="1200">
+              <a:rPr lang="en" sz="1200" dirty="0">
                 <a:solidFill>
                   <a:schemeClr val="dk1"/>
                 </a:solidFill>
@@ -16874,9 +17651,45 @@
                 <a:cs typeface="Consolas"/>
                 <a:sym typeface="Consolas"/>
               </a:rPr>
-              <a:t>#SBATCH --mem-per-cpu=1024M             </a:t>
-            </a:r>
-            <a:endParaRPr sz="1200">
+              <a:t>#SBATCH --</a:t>
+            </a:r>
+            <a:r>
+              <a:rPr lang="en" sz="1200" dirty="0" smtClean="0">
+                <a:solidFill>
+                  <a:schemeClr val="dk1"/>
+                </a:solidFill>
+                <a:latin typeface="Consolas"/>
+                <a:ea typeface="Consolas"/>
+                <a:cs typeface="Consolas"/>
+                <a:sym typeface="Consolas"/>
+              </a:rPr>
+              <a:t>mem-per-</a:t>
+            </a:r>
+            <a:r>
+              <a:rPr lang="en" sz="1200" dirty="0" err="1" smtClean="0">
+                <a:solidFill>
+                  <a:schemeClr val="dk1"/>
+                </a:solidFill>
+                <a:latin typeface="Consolas"/>
+                <a:ea typeface="Consolas"/>
+                <a:cs typeface="Consolas"/>
+                <a:sym typeface="Consolas"/>
+              </a:rPr>
+              <a:t>cpu</a:t>
+            </a:r>
+            <a:r>
+              <a:rPr lang="en" sz="1200" dirty="0" smtClean="0">
+                <a:solidFill>
+                  <a:schemeClr val="dk1"/>
+                </a:solidFill>
+                <a:latin typeface="Consolas"/>
+                <a:ea typeface="Consolas"/>
+                <a:cs typeface="Consolas"/>
+                <a:sym typeface="Consolas"/>
+              </a:rPr>
+              <a:t>=1024M</a:t>
+            </a:r>
+            <a:endParaRPr sz="1200" dirty="0">
               <a:solidFill>
                 <a:schemeClr val="dk1"/>
               </a:solidFill>
@@ -16902,7 +17715,7 @@
               <a:buNone/>
             </a:pPr>
             <a:r>
-              <a:rPr lang="en" sz="1200">
+              <a:rPr lang="en" sz="1200" dirty="0">
                 <a:solidFill>
                   <a:schemeClr val="dk1"/>
                 </a:solidFill>
@@ -16911,9 +17724,21 @@
                 <a:cs typeface="Consolas"/>
                 <a:sym typeface="Consolas"/>
               </a:rPr>
-              <a:t>#SBATCH --time=00:00:05                 </a:t>
-            </a:r>
-            <a:endParaRPr sz="1200">
+              <a:t>#SBATCH --</a:t>
+            </a:r>
+            <a:r>
+              <a:rPr lang="en" sz="1200" dirty="0" smtClean="0">
+                <a:solidFill>
+                  <a:schemeClr val="dk1"/>
+                </a:solidFill>
+                <a:latin typeface="Consolas"/>
+                <a:ea typeface="Consolas"/>
+                <a:cs typeface="Consolas"/>
+                <a:sym typeface="Consolas"/>
+              </a:rPr>
+              <a:t>time=00:00:05</a:t>
+            </a:r>
+            <a:endParaRPr sz="1200" dirty="0">
               <a:solidFill>
                 <a:schemeClr val="dk1"/>
               </a:solidFill>
@@ -16939,7 +17764,7 @@
               <a:buNone/>
             </a:pPr>
             <a:r>
-              <a:rPr lang="en" sz="1200">
+              <a:rPr lang="en" sz="1200" dirty="0">
                 <a:solidFill>
                   <a:schemeClr val="dk1"/>
                 </a:solidFill>
@@ -16948,9 +17773,21 @@
                 <a:cs typeface="Consolas"/>
                 <a:sym typeface="Consolas"/>
               </a:rPr>
-              <a:t>export OMP_NUM_THREADS=$SLURM_CPUS_PER_TASK     </a:t>
-            </a:r>
-            <a:endParaRPr sz="1200">
+              <a:t>export OMP_NUM_THREADS=$</a:t>
+            </a:r>
+            <a:r>
+              <a:rPr lang="en" sz="1200" dirty="0" smtClean="0">
+                <a:solidFill>
+                  <a:schemeClr val="dk1"/>
+                </a:solidFill>
+                <a:latin typeface="Consolas"/>
+                <a:ea typeface="Consolas"/>
+                <a:cs typeface="Consolas"/>
+                <a:sym typeface="Consolas"/>
+              </a:rPr>
+              <a:t>SLURM_CPUS_PER_TASK</a:t>
+            </a:r>
+            <a:endParaRPr sz="1200" dirty="0">
               <a:solidFill>
                 <a:schemeClr val="dk1"/>
               </a:solidFill>
@@ -16976,7 +17813,7 @@
               <a:buNone/>
             </a:pPr>
             <a:r>
-              <a:rPr lang="en" sz="1200">
+              <a:rPr lang="en" sz="1200" dirty="0">
                 <a:solidFill>
                   <a:schemeClr val="dk1"/>
                 </a:solidFill>
@@ -16987,7 +17824,7 @@
               </a:rPr>
               <a:t>echo "Hostname is: `hostname`"</a:t>
             </a:r>
-            <a:endParaRPr sz="1200">
+            <a:endParaRPr sz="1200" dirty="0">
               <a:solidFill>
                 <a:schemeClr val="dk1"/>
               </a:solidFill>
@@ -17013,7 +17850,7 @@
               <a:buNone/>
             </a:pPr>
             <a:r>
-              <a:rPr lang="en" sz="1200">
+              <a:rPr lang="en" sz="1200" dirty="0">
                 <a:solidFill>
                   <a:schemeClr val="dk1"/>
                 </a:solidFill>
@@ -17022,9 +17859,33 @@
                 <a:cs typeface="Consolas"/>
                 <a:sym typeface="Consolas"/>
               </a:rPr>
-              <a:t>echo "Nvidia-smi info is:"</a:t>
-            </a:r>
-            <a:endParaRPr sz="1200">
+              <a:t>echo "</a:t>
+            </a:r>
+            <a:r>
+              <a:rPr lang="en" sz="1200" dirty="0" err="1">
+                <a:solidFill>
+                  <a:schemeClr val="dk1"/>
+                </a:solidFill>
+                <a:latin typeface="Consolas"/>
+                <a:ea typeface="Consolas"/>
+                <a:cs typeface="Consolas"/>
+                <a:sym typeface="Consolas"/>
+              </a:rPr>
+              <a:t>Nvidia-smi</a:t>
+            </a:r>
+            <a:r>
+              <a:rPr lang="en" sz="1200" dirty="0">
+                <a:solidFill>
+                  <a:schemeClr val="dk1"/>
+                </a:solidFill>
+                <a:latin typeface="Consolas"/>
+                <a:ea typeface="Consolas"/>
+                <a:cs typeface="Consolas"/>
+                <a:sym typeface="Consolas"/>
+              </a:rPr>
+              <a:t> info is:"</a:t>
+            </a:r>
+            <a:endParaRPr sz="1200" dirty="0">
               <a:solidFill>
                 <a:schemeClr val="dk1"/>
               </a:solidFill>
@@ -17050,7 +17911,7 @@
               <a:buNone/>
             </a:pPr>
             <a:r>
-              <a:rPr lang="en" sz="1200">
+              <a:rPr lang="en" sz="1200" dirty="0" err="1">
                 <a:solidFill>
                   <a:schemeClr val="dk1"/>
                 </a:solidFill>
@@ -17061,7 +17922,7 @@
               </a:rPr>
               <a:t>nvidia-smi</a:t>
             </a:r>
-            <a:endParaRPr sz="1200">
+            <a:endParaRPr sz="1200" dirty="0">
               <a:solidFill>
                 <a:schemeClr val="dk1"/>
               </a:solidFill>
@@ -17087,7 +17948,7 @@
               <a:buNone/>
             </a:pPr>
             <a:r>
-              <a:rPr lang="en" sz="1200">
+              <a:rPr lang="en" sz="1200" dirty="0">
                 <a:solidFill>
                   <a:schemeClr val="dk1"/>
                 </a:solidFill>
@@ -17096,9 +17957,33 @@
                 <a:cs typeface="Consolas"/>
                 <a:sym typeface="Consolas"/>
               </a:rPr>
-              <a:t>echo "Current working directory is: `pwd`"</a:t>
-            </a:r>
-            <a:endParaRPr sz="1200">
+              <a:t>echo "Current working directory is: `</a:t>
+            </a:r>
+            <a:r>
+              <a:rPr lang="en" sz="1200" dirty="0" err="1">
+                <a:solidFill>
+                  <a:schemeClr val="dk1"/>
+                </a:solidFill>
+                <a:latin typeface="Consolas"/>
+                <a:ea typeface="Consolas"/>
+                <a:cs typeface="Consolas"/>
+                <a:sym typeface="Consolas"/>
+              </a:rPr>
+              <a:t>pwd</a:t>
+            </a:r>
+            <a:r>
+              <a:rPr lang="en" sz="1200" dirty="0">
+                <a:solidFill>
+                  <a:schemeClr val="dk1"/>
+                </a:solidFill>
+                <a:latin typeface="Consolas"/>
+                <a:ea typeface="Consolas"/>
+                <a:cs typeface="Consolas"/>
+                <a:sym typeface="Consolas"/>
+              </a:rPr>
+              <a:t>`"</a:t>
+            </a:r>
+            <a:endParaRPr sz="1200" dirty="0">
               <a:solidFill>
                 <a:schemeClr val="dk1"/>
               </a:solidFill>
@@ -17124,7 +18009,7 @@
               <a:buNone/>
             </a:pPr>
             <a:r>
-              <a:rPr lang="en" sz="1200">
+              <a:rPr lang="en" sz="1200" dirty="0" err="1">
                 <a:solidFill>
                   <a:schemeClr val="dk1"/>
                 </a:solidFill>
@@ -17133,9 +18018,117 @@
                 <a:cs typeface="Consolas"/>
                 <a:sym typeface="Consolas"/>
               </a:rPr>
-              <a:t>srun ./acc_laplace.exe   # mpirun or mpiexec also works</a:t>
-            </a:r>
-            <a:endParaRPr sz="1200">
+              <a:t>srun</a:t>
+            </a:r>
+            <a:r>
+              <a:rPr lang="en" sz="1200" dirty="0">
+                <a:solidFill>
+                  <a:schemeClr val="dk1"/>
+                </a:solidFill>
+                <a:latin typeface="Consolas"/>
+                <a:ea typeface="Consolas"/>
+                <a:cs typeface="Consolas"/>
+                <a:sym typeface="Consolas"/>
+              </a:rPr>
+              <a:t> </a:t>
+            </a:r>
+            <a:r>
+              <a:rPr lang="en" sz="1200" dirty="0" smtClean="0">
+                <a:solidFill>
+                  <a:schemeClr val="dk1"/>
+                </a:solidFill>
+                <a:latin typeface="Consolas"/>
+                <a:ea typeface="Consolas"/>
+                <a:cs typeface="Consolas"/>
+                <a:sym typeface="Consolas"/>
+              </a:rPr>
+              <a:t>./</a:t>
+            </a:r>
+            <a:r>
+              <a:rPr lang="en-US" sz="1200" dirty="0" smtClean="0">
+                <a:solidFill>
+                  <a:schemeClr val="dk1"/>
+                </a:solidFill>
+                <a:latin typeface="Consolas"/>
+                <a:ea typeface="Consolas"/>
+                <a:cs typeface="Consolas"/>
+                <a:sym typeface="Consolas"/>
+              </a:rPr>
+              <a:t>diffusion</a:t>
+            </a:r>
+            <a:r>
+              <a:rPr lang="en" sz="1200" dirty="0" smtClean="0">
+                <a:solidFill>
+                  <a:schemeClr val="dk1"/>
+                </a:solidFill>
+                <a:latin typeface="Consolas"/>
+                <a:ea typeface="Consolas"/>
+                <a:cs typeface="Consolas"/>
+                <a:sym typeface="Consolas"/>
+              </a:rPr>
+              <a:t>.exe   </a:t>
+            </a:r>
+            <a:r>
+              <a:rPr lang="en" sz="1200" dirty="0">
+                <a:solidFill>
+                  <a:schemeClr val="dk1"/>
+                </a:solidFill>
+                <a:latin typeface="Consolas"/>
+                <a:ea typeface="Consolas"/>
+                <a:cs typeface="Consolas"/>
+                <a:sym typeface="Consolas"/>
+              </a:rPr>
+              <a:t># </a:t>
+            </a:r>
+            <a:r>
+              <a:rPr lang="en" sz="1200" dirty="0" err="1">
+                <a:solidFill>
+                  <a:schemeClr val="dk1"/>
+                </a:solidFill>
+                <a:latin typeface="Consolas"/>
+                <a:ea typeface="Consolas"/>
+                <a:cs typeface="Consolas"/>
+                <a:sym typeface="Consolas"/>
+              </a:rPr>
+              <a:t>mpirun</a:t>
+            </a:r>
+            <a:r>
+              <a:rPr lang="en" sz="1200" dirty="0">
+                <a:solidFill>
+                  <a:schemeClr val="dk1"/>
+                </a:solidFill>
+                <a:latin typeface="Consolas"/>
+                <a:ea typeface="Consolas"/>
+                <a:cs typeface="Consolas"/>
+                <a:sym typeface="Consolas"/>
+              </a:rPr>
+              <a:t> or </a:t>
+            </a:r>
+            <a:r>
+              <a:rPr lang="en" sz="1200" dirty="0" err="1">
+                <a:solidFill>
+                  <a:schemeClr val="dk1"/>
+                </a:solidFill>
+                <a:latin typeface="Consolas"/>
+                <a:ea typeface="Consolas"/>
+                <a:cs typeface="Consolas"/>
+                <a:sym typeface="Consolas"/>
+              </a:rPr>
+              <a:t>mpiexec</a:t>
+            </a:r>
+            <a:r>
+              <a:rPr lang="en" sz="1200" dirty="0">
+                <a:solidFill>
+                  <a:schemeClr val="dk1"/>
+                </a:solidFill>
+                <a:latin typeface="Consolas"/>
+                <a:ea typeface="Consolas"/>
+                <a:cs typeface="Consolas"/>
+                <a:sym typeface="Consolas"/>
+              </a:rPr>
+              <a:t> also works</a:t>
+            </a:r>
+            <a:endParaRPr sz="1200" dirty="0">
               <a:solidFill>
                 <a:schemeClr val="dk1"/>
               </a:solidFill>
@@ -17160,7 +18153,7 @@
               <a:buFont typeface="Arial"/>
               <a:buNone/>
             </a:pPr>
-            <a:endParaRPr sz="1200">
+            <a:endParaRPr sz="1200" dirty="0">
               <a:solidFill>
                 <a:schemeClr val="dk1"/>
               </a:solidFill>
@@ -17180,7 +18173,7 @@
               </a:spcAft>
               <a:buNone/>
             </a:pPr>
-            <a:endParaRPr sz="1200">
+            <a:endParaRPr sz="1200" dirty="0">
               <a:solidFill>
                 <a:schemeClr val="dk1"/>
               </a:solidFill>
@@ -17200,7 +18193,7 @@
               </a:spcAft>
               <a:buNone/>
             </a:pPr>
-            <a:endParaRPr sz="1200">
+            <a:endParaRPr sz="1200" dirty="0">
               <a:solidFill>
                 <a:schemeClr val="dk1"/>
               </a:solidFill>
@@ -18208,7 +19201,7 @@
               <a:buNone/>
             </a:pPr>
             <a:r>
-              <a:rPr lang="en" sz="1300" b="1">
+              <a:rPr lang="en" sz="1300" b="1" dirty="0">
                 <a:solidFill>
                   <a:srgbClr val="000000"/>
                 </a:solidFill>
@@ -18219,7 +19212,7 @@
               </a:rPr>
               <a:t>Login:</a:t>
             </a:r>
-            <a:endParaRPr sz="1300" b="1">
+            <a:endParaRPr sz="1300" b="1" dirty="0">
               <a:solidFill>
                 <a:schemeClr val="dk1"/>
               </a:solidFill>
@@ -18248,75 +19241,122 @@
               <a:buNone/>
             </a:pPr>
             <a:r>
-              <a:rPr lang="en" sz="1300" b="1">
-                <a:solidFill>
-                  <a:schemeClr val="dk1"/>
-                </a:solidFill>
-                <a:latin typeface="Source Code Pro"/>
-                <a:ea typeface="Source Code Pro"/>
-                <a:cs typeface="Source Code Pro"/>
+              <a:rPr lang="en" sz="1300" b="1" dirty="0">
+                <a:solidFill>
+                  <a:schemeClr val="dk1"/>
+                </a:solidFill>
+                <a:latin typeface="Consolas" charset="0"/>
+                <a:ea typeface="Consolas" charset="0"/>
+                <a:cs typeface="Consolas" charset="0"/>
                 <a:sym typeface="Source Code Pro"/>
               </a:rPr>
-              <a:t>$ ssh</a:t>
-            </a:r>
-            <a:r>
-              <a:rPr lang="en" sz="1300" b="1">
+              <a:t>$ </a:t>
+            </a:r>
+            <a:r>
+              <a:rPr lang="en" sz="1300" b="1" dirty="0" err="1">
+                <a:solidFill>
+                  <a:schemeClr val="dk1"/>
+                </a:solidFill>
+                <a:latin typeface="Consolas" charset="0"/>
+                <a:ea typeface="Consolas" charset="0"/>
+                <a:cs typeface="Consolas" charset="0"/>
+                <a:sym typeface="Source Code Pro"/>
+              </a:rPr>
+              <a:t>ssh</a:t>
+            </a:r>
+            <a:r>
+              <a:rPr lang="en" sz="1300" b="1" dirty="0">
                 <a:solidFill>
                   <a:schemeClr val="dk1"/>
                 </a:solidFill>
                 <a:highlight>
                   <a:srgbClr val="00FFFF"/>
                 </a:highlight>
-                <a:latin typeface="Source Code Pro"/>
-                <a:ea typeface="Source Code Pro"/>
-                <a:cs typeface="Source Code Pro"/>
+                <a:latin typeface="Consolas" charset="0"/>
+                <a:ea typeface="Consolas" charset="0"/>
+                <a:cs typeface="Consolas" charset="0"/>
                 <a:sym typeface="Source Code Pro"/>
               </a:rPr>
               <a:t> </a:t>
             </a:r>
             <a:r>
-              <a:rPr lang="en" sz="1300" b="1">
+              <a:rPr lang="en" sz="1300" b="1" dirty="0">
                 <a:solidFill>
                   <a:schemeClr val="dk1"/>
                 </a:solidFill>
                 <a:highlight>
                   <a:srgbClr val="FFFF00"/>
                 </a:highlight>
-                <a:latin typeface="Source Code Pro"/>
-                <a:ea typeface="Source Code Pro"/>
-                <a:cs typeface="Source Code Pro"/>
+                <a:latin typeface="Consolas" charset="0"/>
+                <a:ea typeface="Consolas" charset="0"/>
+                <a:cs typeface="Consolas" charset="0"/>
                 <a:sym typeface="Source Code Pro"/>
               </a:rPr>
               <a:t>&lt;username&gt;</a:t>
             </a:r>
             <a:r>
-              <a:rPr lang="en" sz="1300" b="1">
-                <a:solidFill>
-                  <a:schemeClr val="dk1"/>
-                </a:solidFill>
-                <a:latin typeface="Source Code Pro"/>
-                <a:ea typeface="Source Code Pro"/>
-                <a:cs typeface="Source Code Pro"/>
+              <a:rPr lang="en" sz="1300" b="1" dirty="0">
+                <a:solidFill>
+                  <a:schemeClr val="dk1"/>
+                </a:solidFill>
+                <a:latin typeface="Consolas" charset="0"/>
+                <a:ea typeface="Consolas" charset="0"/>
+                <a:cs typeface="Consolas" charset="0"/>
                 <a:sym typeface="Source Code Pro"/>
               </a:rPr>
-              <a:t>@cedar.computecanada.ca</a:t>
-            </a:r>
-            <a:r>
-              <a:rPr lang="en" sz="1300" b="1">
+              <a:t>@</a:t>
+            </a:r>
+            <a:r>
+              <a:rPr lang="en" sz="1300" b="1" dirty="0" err="1">
+                <a:solidFill>
+                  <a:schemeClr val="dk1"/>
+                </a:solidFill>
+                <a:latin typeface="Consolas" charset="0"/>
+                <a:ea typeface="Consolas" charset="0"/>
+                <a:cs typeface="Consolas" charset="0"/>
+                <a:sym typeface="Source Code Pro"/>
+              </a:rPr>
+              <a:t>cedar.computecanada.ca</a:t>
+            </a:r>
+            <a:r>
+              <a:rPr lang="en" sz="1300" b="1" dirty="0">
                 <a:solidFill>
                   <a:schemeClr val="dk1"/>
                 </a:solidFill>
                 <a:highlight>
                   <a:srgbClr val="00FF00"/>
                 </a:highlight>
-                <a:latin typeface="Source Code Pro"/>
-                <a:ea typeface="Source Code Pro"/>
-                <a:cs typeface="Source Code Pro"/>
+                <a:latin typeface="Consolas" charset="0"/>
+                <a:ea typeface="Consolas" charset="0"/>
+                <a:cs typeface="Consolas" charset="0"/>
                 <a:sym typeface="Source Code Pro"/>
               </a:rPr>
               <a:t>&lt;ENTER&gt;</a:t>
             </a:r>
-            <a:endParaRPr sz="1300">
+            <a:endParaRPr sz="1300" dirty="0">
+              <a:solidFill>
+                <a:srgbClr val="000000"/>
+              </a:solidFill>
+              <a:latin typeface="Consolas" charset="0"/>
+              <a:ea typeface="Consolas" charset="0"/>
+              <a:cs typeface="Consolas" charset="0"/>
+              <a:sym typeface="Times New Roman"/>
+            </a:endParaRPr>
+          </a:p>
+          <a:p>
+            <a:pPr marL="0" marR="0" lvl="0" indent="0" algn="l" rtl="0">
+              <a:lnSpc>
+                <a:spcPct val="115000"/>
+              </a:lnSpc>
+              <a:spcBef>
+                <a:spcPts val="0"/>
+              </a:spcBef>
+              <a:spcAft>
+                <a:spcPts val="0"/>
+              </a:spcAft>
+              <a:buNone/>
+            </a:pPr>
+            <a:endParaRPr sz="1300" dirty="0">
               <a:solidFill>
                 <a:srgbClr val="000000"/>
               </a:solidFill>
@@ -18339,7 +19379,19 @@
               </a:spcAft>
               <a:buNone/>
             </a:pPr>
-            <a:endParaRPr sz="1300">
+            <a:r>
+              <a:rPr lang="en" sz="1300" b="1" dirty="0">
+                <a:solidFill>
+                  <a:srgbClr val="000000"/>
+                </a:solidFill>
+                <a:latin typeface="Times New Roman"/>
+                <a:ea typeface="Times New Roman"/>
+                <a:cs typeface="Times New Roman"/>
+                <a:sym typeface="Times New Roman"/>
+              </a:rPr>
+              <a:t>Interactive node request:</a:t>
+            </a:r>
+            <a:endParaRPr sz="1300" b="1" dirty="0">
               <a:solidFill>
                 <a:srgbClr val="000000"/>
               </a:solidFill>
@@ -18363,782 +19415,234 @@
               <a:buNone/>
             </a:pPr>
             <a:r>
-              <a:rPr lang="en" sz="1300" b="1">
-                <a:solidFill>
-                  <a:srgbClr val="000000"/>
-                </a:solidFill>
-                <a:latin typeface="Times New Roman"/>
-                <a:ea typeface="Times New Roman"/>
-                <a:cs typeface="Times New Roman"/>
-                <a:sym typeface="Times New Roman"/>
-              </a:rPr>
-              <a:t>Interactive node request:</a:t>
-            </a:r>
-            <a:endParaRPr sz="1300" b="1">
-              <a:solidFill>
-                <a:srgbClr val="000000"/>
-              </a:solidFill>
-              <a:latin typeface="Times New Roman"/>
-              <a:ea typeface="Times New Roman"/>
-              <a:cs typeface="Times New Roman"/>
-              <a:sym typeface="Times New Roman"/>
-            </a:endParaRPr>
-          </a:p>
-          <a:p>
-            <a:pPr marL="0" marR="0" lvl="0" indent="0" algn="l" rtl="0">
-              <a:lnSpc>
-                <a:spcPct val="115000"/>
-              </a:lnSpc>
-              <a:spcBef>
-                <a:spcPts val="0"/>
-              </a:spcBef>
-              <a:spcAft>
-                <a:spcPts val="0"/>
-              </a:spcAft>
-              <a:buNone/>
-            </a:pPr>
-            <a:r>
-              <a:rPr lang="en" sz="1300" b="1">
-                <a:solidFill>
-                  <a:schemeClr val="dk1"/>
-                </a:solidFill>
-                <a:latin typeface="Source Code Pro"/>
-                <a:ea typeface="Source Code Pro"/>
-                <a:cs typeface="Source Code Pro"/>
+              <a:rPr lang="en" sz="1300" b="1" dirty="0">
+                <a:solidFill>
+                  <a:schemeClr val="dk1"/>
+                </a:solidFill>
+                <a:latin typeface="Consolas" charset="0"/>
+                <a:ea typeface="Consolas" charset="0"/>
+                <a:cs typeface="Consolas" charset="0"/>
                 <a:sym typeface="Source Code Pro"/>
               </a:rPr>
-              <a:t>$ salloc</a:t>
-            </a:r>
-            <a:r>
-              <a:rPr lang="en" sz="1300" b="1">
+              <a:t>$ </a:t>
+            </a:r>
+            <a:r>
+              <a:rPr lang="en" sz="1300" b="1" dirty="0" err="1">
+                <a:solidFill>
+                  <a:schemeClr val="dk1"/>
+                </a:solidFill>
+                <a:latin typeface="Consolas" charset="0"/>
+                <a:ea typeface="Consolas" charset="0"/>
+                <a:cs typeface="Consolas" charset="0"/>
+                <a:sym typeface="Source Code Pro"/>
+              </a:rPr>
+              <a:t>salloc</a:t>
+            </a:r>
+            <a:r>
+              <a:rPr lang="en" sz="1300" b="1" dirty="0">
                 <a:solidFill>
                   <a:schemeClr val="dk1"/>
                 </a:solidFill>
                 <a:highlight>
                   <a:srgbClr val="00FFFF"/>
                 </a:highlight>
-                <a:latin typeface="Source Code Pro"/>
-                <a:ea typeface="Source Code Pro"/>
-                <a:cs typeface="Source Code Pro"/>
+                <a:latin typeface="Consolas" charset="0"/>
+                <a:ea typeface="Consolas" charset="0"/>
+                <a:cs typeface="Consolas" charset="0"/>
                 <a:sym typeface="Source Code Pro"/>
               </a:rPr>
               <a:t> </a:t>
             </a:r>
             <a:r>
-              <a:rPr lang="en" sz="1300" b="1">
-                <a:solidFill>
-                  <a:schemeClr val="dk1"/>
-                </a:solidFill>
-                <a:latin typeface="Source Code Pro"/>
-                <a:ea typeface="Source Code Pro"/>
-                <a:cs typeface="Source Code Pro"/>
+              <a:rPr lang="en" sz="1300" b="1" dirty="0">
+                <a:solidFill>
+                  <a:schemeClr val="dk1"/>
+                </a:solidFill>
+                <a:latin typeface="Consolas" charset="0"/>
+                <a:ea typeface="Consolas" charset="0"/>
+                <a:cs typeface="Consolas" charset="0"/>
                 <a:sym typeface="Source Code Pro"/>
               </a:rPr>
               <a:t>--time=1:0:0</a:t>
             </a:r>
             <a:r>
-              <a:rPr lang="en" sz="1300" b="1">
+              <a:rPr lang="en" sz="1300" b="1" dirty="0">
                 <a:solidFill>
                   <a:schemeClr val="dk1"/>
                 </a:solidFill>
                 <a:highlight>
                   <a:srgbClr val="00FFFF"/>
                 </a:highlight>
-                <a:latin typeface="Source Code Pro"/>
-                <a:ea typeface="Source Code Pro"/>
-                <a:cs typeface="Source Code Pro"/>
+                <a:latin typeface="Consolas" charset="0"/>
+                <a:ea typeface="Consolas" charset="0"/>
+                <a:cs typeface="Consolas" charset="0"/>
                 <a:sym typeface="Source Code Pro"/>
               </a:rPr>
               <a:t> </a:t>
             </a:r>
             <a:r>
-              <a:rPr lang="en" sz="1300" b="1">
-                <a:solidFill>
-                  <a:schemeClr val="dk1"/>
-                </a:solidFill>
-                <a:latin typeface="Source Code Pro"/>
-                <a:ea typeface="Source Code Pro"/>
-                <a:cs typeface="Source Code Pro"/>
+              <a:rPr lang="en" sz="1300" b="1" dirty="0">
+                <a:solidFill>
+                  <a:schemeClr val="dk1"/>
+                </a:solidFill>
+                <a:latin typeface="Consolas" charset="0"/>
+                <a:ea typeface="Consolas" charset="0"/>
+                <a:cs typeface="Consolas" charset="0"/>
                 <a:sym typeface="Source Code Pro"/>
               </a:rPr>
-              <a:t>--ntasks=16</a:t>
-            </a:r>
-            <a:r>
-              <a:rPr lang="en" sz="1300" b="1">
+              <a:t>--</a:t>
+            </a:r>
+            <a:r>
+              <a:rPr lang="en" sz="1300" b="1" dirty="0" err="1">
+                <a:solidFill>
+                  <a:schemeClr val="dk1"/>
+                </a:solidFill>
+                <a:latin typeface="Consolas" charset="0"/>
+                <a:ea typeface="Consolas" charset="0"/>
+                <a:cs typeface="Consolas" charset="0"/>
+                <a:sym typeface="Source Code Pro"/>
+              </a:rPr>
+              <a:t>ntasks</a:t>
+            </a:r>
+            <a:r>
+              <a:rPr lang="en" sz="1300" b="1" dirty="0">
+                <a:solidFill>
+                  <a:schemeClr val="dk1"/>
+                </a:solidFill>
+                <a:latin typeface="Consolas" charset="0"/>
+                <a:ea typeface="Consolas" charset="0"/>
+                <a:cs typeface="Consolas" charset="0"/>
+                <a:sym typeface="Source Code Pro"/>
+              </a:rPr>
+              <a:t>=16</a:t>
+            </a:r>
+            <a:r>
+              <a:rPr lang="en" sz="1300" b="1" dirty="0">
                 <a:solidFill>
                   <a:schemeClr val="dk1"/>
                 </a:solidFill>
                 <a:highlight>
                   <a:srgbClr val="00FFFF"/>
                 </a:highlight>
-                <a:latin typeface="Source Code Pro"/>
-                <a:ea typeface="Source Code Pro"/>
-                <a:cs typeface="Source Code Pro"/>
+                <a:latin typeface="Consolas" charset="0"/>
+                <a:ea typeface="Consolas" charset="0"/>
+                <a:cs typeface="Consolas" charset="0"/>
                 <a:sym typeface="Source Code Pro"/>
               </a:rPr>
               <a:t> </a:t>
             </a:r>
             <a:r>
-              <a:rPr lang="en" sz="1300" b="1">
-                <a:solidFill>
-                  <a:schemeClr val="dk1"/>
-                </a:solidFill>
-                <a:latin typeface="Source Code Pro"/>
-                <a:ea typeface="Source Code Pro"/>
-                <a:cs typeface="Source Code Pro"/>
+              <a:rPr lang="en" sz="1300" b="1" dirty="0">
+                <a:solidFill>
+                  <a:schemeClr val="dk1"/>
+                </a:solidFill>
+                <a:latin typeface="Consolas" charset="0"/>
+                <a:ea typeface="Consolas" charset="0"/>
+                <a:cs typeface="Consolas" charset="0"/>
                 <a:sym typeface="Source Code Pro"/>
               </a:rPr>
-              <a:t>--mem-per-cpu=1GB</a:t>
-            </a:r>
-            <a:r>
-              <a:rPr lang="en" sz="1300" b="1">
+              <a:t>--mem-per-</a:t>
+            </a:r>
+            <a:r>
+              <a:rPr lang="en" sz="1300" b="1" dirty="0" err="1">
+                <a:solidFill>
+                  <a:schemeClr val="dk1"/>
+                </a:solidFill>
+                <a:latin typeface="Consolas" charset="0"/>
+                <a:ea typeface="Consolas" charset="0"/>
+                <a:cs typeface="Consolas" charset="0"/>
+                <a:sym typeface="Source Code Pro"/>
+              </a:rPr>
+              <a:t>cpu</a:t>
+            </a:r>
+            <a:r>
+              <a:rPr lang="en" sz="1300" b="1" dirty="0">
+                <a:solidFill>
+                  <a:schemeClr val="dk1"/>
+                </a:solidFill>
+                <a:latin typeface="Consolas" charset="0"/>
+                <a:ea typeface="Consolas" charset="0"/>
+                <a:cs typeface="Consolas" charset="0"/>
+                <a:sym typeface="Source Code Pro"/>
+              </a:rPr>
+              <a:t>=1GB</a:t>
+            </a:r>
+            <a:r>
+              <a:rPr lang="en" sz="1300" b="1" dirty="0">
                 <a:solidFill>
                   <a:schemeClr val="dk1"/>
                 </a:solidFill>
                 <a:highlight>
                   <a:srgbClr val="00FFFF"/>
                 </a:highlight>
-                <a:latin typeface="Source Code Pro"/>
-                <a:ea typeface="Source Code Pro"/>
-                <a:cs typeface="Source Code Pro"/>
+                <a:latin typeface="Consolas" charset="0"/>
+                <a:ea typeface="Consolas" charset="0"/>
+                <a:cs typeface="Consolas" charset="0"/>
                 <a:sym typeface="Source Code Pro"/>
               </a:rPr>
               <a:t> </a:t>
             </a:r>
             <a:r>
-              <a:rPr lang="en" sz="1300" b="1">
-                <a:solidFill>
-                  <a:schemeClr val="dk1"/>
-                </a:solidFill>
-                <a:latin typeface="Source Code Pro"/>
-                <a:ea typeface="Source Code Pro"/>
-                <a:cs typeface="Source Code Pro"/>
+              <a:rPr lang="en" sz="1300" b="1" dirty="0">
+                <a:solidFill>
+                  <a:schemeClr val="dk1"/>
+                </a:solidFill>
+                <a:latin typeface="Consolas" charset="0"/>
+                <a:ea typeface="Consolas" charset="0"/>
+                <a:cs typeface="Consolas" charset="0"/>
                 <a:sym typeface="Source Code Pro"/>
               </a:rPr>
-              <a:t>--account=def-mludin</a:t>
-            </a:r>
-            <a:r>
-              <a:rPr lang="en" sz="1300" b="1">
+              <a:t>--account=</a:t>
+            </a:r>
+            <a:r>
+              <a:rPr lang="en" sz="1300" b="1" dirty="0" err="1">
+                <a:solidFill>
+                  <a:schemeClr val="dk1"/>
+                </a:solidFill>
+                <a:latin typeface="Consolas" charset="0"/>
+                <a:ea typeface="Consolas" charset="0"/>
+                <a:cs typeface="Consolas" charset="0"/>
+                <a:sym typeface="Source Code Pro"/>
+              </a:rPr>
+              <a:t>def-mludin</a:t>
+            </a:r>
+            <a:r>
+              <a:rPr lang="en" sz="1300" b="1" dirty="0">
                 <a:solidFill>
                   <a:schemeClr val="dk1"/>
                 </a:solidFill>
                 <a:highlight>
                   <a:srgbClr val="00FF00"/>
                 </a:highlight>
-                <a:latin typeface="Source Code Pro"/>
-                <a:ea typeface="Source Code Pro"/>
-                <a:cs typeface="Source Code Pro"/>
+                <a:latin typeface="Consolas" charset="0"/>
+                <a:ea typeface="Consolas" charset="0"/>
+                <a:cs typeface="Consolas" charset="0"/>
                 <a:sym typeface="Source Code Pro"/>
               </a:rPr>
-              <a:t>&lt;ENTER&gt;</a:t>
-            </a:r>
-            <a:endParaRPr sz="1300" b="1">
+              <a:t>&lt;ENTER</a:t>
+            </a:r>
+            <a:r>
+              <a:rPr lang="en" sz="1300" b="1" dirty="0" smtClean="0">
+                <a:solidFill>
+                  <a:schemeClr val="dk1"/>
+                </a:solidFill>
+                <a:highlight>
+                  <a:srgbClr val="00FF00"/>
+                </a:highlight>
+                <a:latin typeface="Consolas" charset="0"/>
+                <a:ea typeface="Consolas" charset="0"/>
+                <a:cs typeface="Consolas" charset="0"/>
+                <a:sym typeface="Source Code Pro"/>
+              </a:rPr>
+              <a:t>&gt;</a:t>
+            </a:r>
+            <a:endParaRPr sz="1300" b="1" dirty="0">
               <a:solidFill>
                 <a:schemeClr val="dk1"/>
               </a:solidFill>
-              <a:latin typeface="Source Code Pro"/>
-              <a:ea typeface="Source Code Pro"/>
-              <a:cs typeface="Source Code Pro"/>
-              <a:sym typeface="Source Code Pro"/>
-            </a:endParaRPr>
-          </a:p>
-          <a:p>
-            <a:pPr marL="0" marR="0" lvl="0" indent="0" algn="l" rtl="0">
-              <a:lnSpc>
-                <a:spcPct val="115000"/>
-              </a:lnSpc>
-              <a:spcBef>
-                <a:spcPts val="0"/>
-              </a:spcBef>
-              <a:spcAft>
-                <a:spcPts val="0"/>
-              </a:spcAft>
-              <a:buNone/>
-            </a:pPr>
-            <a:endParaRPr sz="1300" b="1">
-              <a:solidFill>
-                <a:schemeClr val="dk1"/>
-              </a:solidFill>
-              <a:latin typeface="Source Code Pro"/>
-              <a:ea typeface="Source Code Pro"/>
-              <a:cs typeface="Source Code Pro"/>
-              <a:sym typeface="Source Code Pro"/>
-            </a:endParaRPr>
-          </a:p>
-          <a:p>
-            <a:pPr marL="0" marR="0" lvl="0" indent="0" algn="l" rtl="0">
-              <a:lnSpc>
-                <a:spcPct val="115000"/>
-              </a:lnSpc>
-              <a:spcBef>
-                <a:spcPts val="0"/>
-              </a:spcBef>
-              <a:spcAft>
-                <a:spcPts val="0"/>
-              </a:spcAft>
-              <a:buNone/>
-            </a:pPr>
-            <a:r>
-              <a:rPr lang="en" sz="1300" b="1">
-                <a:solidFill>
-                  <a:srgbClr val="000000"/>
-                </a:solidFill>
-                <a:latin typeface="Times New Roman"/>
-                <a:ea typeface="Times New Roman"/>
-                <a:cs typeface="Times New Roman"/>
-                <a:sym typeface="Times New Roman"/>
-              </a:rPr>
-              <a:t>Download code:</a:t>
-            </a:r>
-            <a:endParaRPr sz="1300" b="1">
-              <a:solidFill>
-                <a:schemeClr val="dk1"/>
-              </a:solidFill>
-              <a:latin typeface="Source Code Pro"/>
-              <a:ea typeface="Source Code Pro"/>
-              <a:cs typeface="Source Code Pro"/>
-              <a:sym typeface="Source Code Pro"/>
-            </a:endParaRPr>
-          </a:p>
-          <a:p>
-            <a:pPr marL="0" marR="0" lvl="0" indent="0" algn="l" rtl="0">
-              <a:lnSpc>
-                <a:spcPct val="115000"/>
-              </a:lnSpc>
-              <a:spcBef>
-                <a:spcPts val="0"/>
-              </a:spcBef>
-              <a:spcAft>
-                <a:spcPts val="0"/>
-              </a:spcAft>
-              <a:buNone/>
-            </a:pPr>
-            <a:r>
-              <a:rPr lang="en" sz="1300" b="1">
-                <a:solidFill>
-                  <a:schemeClr val="dk1"/>
-                </a:solidFill>
-                <a:latin typeface="Source Code Pro"/>
-                <a:ea typeface="Source Code Pro"/>
-                <a:cs typeface="Source Code Pro"/>
-                <a:sym typeface="Source Code Pro"/>
-              </a:rPr>
-              <a:t>$ wget</a:t>
-            </a:r>
-            <a:r>
-              <a:rPr lang="en" sz="1300" b="1">
-                <a:solidFill>
-                  <a:schemeClr val="dk1"/>
-                </a:solidFill>
-                <a:highlight>
-                  <a:srgbClr val="00FFFF"/>
-                </a:highlight>
-                <a:latin typeface="Source Code Pro"/>
-                <a:ea typeface="Source Code Pro"/>
-                <a:cs typeface="Source Code Pro"/>
-                <a:sym typeface="Source Code Pro"/>
-              </a:rPr>
-              <a:t> </a:t>
-            </a:r>
-            <a:r>
-              <a:rPr lang="en" sz="1300" b="1">
-                <a:solidFill>
-                  <a:schemeClr val="dk1"/>
-                </a:solidFill>
-                <a:latin typeface="Source Code Pro"/>
-                <a:ea typeface="Source Code Pro"/>
-                <a:cs typeface="Source Code Pro"/>
-                <a:sym typeface="Source Code Pro"/>
-              </a:rPr>
-              <a:t>http://shodor.org/~mludin/BW_Capstone/running_code_cluster2.tar</a:t>
-            </a:r>
-            <a:r>
-              <a:rPr lang="en" sz="1300" b="1">
-                <a:solidFill>
-                  <a:schemeClr val="dk1"/>
-                </a:solidFill>
-                <a:highlight>
-                  <a:srgbClr val="00FF00"/>
-                </a:highlight>
-                <a:latin typeface="Source Code Pro"/>
-                <a:ea typeface="Source Code Pro"/>
-                <a:cs typeface="Source Code Pro"/>
-                <a:sym typeface="Source Code Pro"/>
-              </a:rPr>
-              <a:t>&lt;ENTER&gt;</a:t>
-            </a:r>
-            <a:endParaRPr sz="1300" b="1">
-              <a:solidFill>
-                <a:schemeClr val="dk1"/>
-              </a:solidFill>
-              <a:highlight>
-                <a:srgbClr val="00FF00"/>
-              </a:highlight>
-              <a:latin typeface="Source Code Pro"/>
-              <a:ea typeface="Source Code Pro"/>
-              <a:cs typeface="Source Code Pro"/>
-              <a:sym typeface="Source Code Pro"/>
-            </a:endParaRPr>
-          </a:p>
-          <a:p>
-            <a:pPr marL="0" marR="0" lvl="0" indent="0" algn="l" rtl="0">
-              <a:lnSpc>
-                <a:spcPct val="115000"/>
-              </a:lnSpc>
-              <a:spcBef>
-                <a:spcPts val="0"/>
-              </a:spcBef>
-              <a:spcAft>
-                <a:spcPts val="0"/>
-              </a:spcAft>
-              <a:buNone/>
-            </a:pPr>
-            <a:endParaRPr sz="1300" b="1">
-              <a:solidFill>
-                <a:srgbClr val="000000"/>
-              </a:solidFill>
-              <a:latin typeface="Times New Roman"/>
-              <a:ea typeface="Times New Roman"/>
-              <a:cs typeface="Times New Roman"/>
-              <a:sym typeface="Times New Roman"/>
-            </a:endParaRPr>
-          </a:p>
-          <a:p>
-            <a:pPr marL="0" marR="0" lvl="0" indent="0" algn="l" rtl="0">
-              <a:lnSpc>
-                <a:spcPct val="115000"/>
-              </a:lnSpc>
-              <a:spcBef>
-                <a:spcPts val="0"/>
-              </a:spcBef>
-              <a:spcAft>
-                <a:spcPts val="0"/>
-              </a:spcAft>
-              <a:buNone/>
-            </a:pPr>
-            <a:r>
-              <a:rPr lang="en" sz="1300" b="1">
-                <a:solidFill>
-                  <a:srgbClr val="000000"/>
-                </a:solidFill>
-                <a:latin typeface="Times New Roman"/>
-                <a:ea typeface="Times New Roman"/>
-                <a:cs typeface="Times New Roman"/>
-                <a:sym typeface="Times New Roman"/>
-              </a:rPr>
-              <a:t>Extract the tar Files:</a:t>
-            </a:r>
-            <a:endParaRPr sz="1300" b="1">
-              <a:solidFill>
-                <a:schemeClr val="dk1"/>
-              </a:solidFill>
-              <a:latin typeface="Source Code Pro"/>
-              <a:ea typeface="Source Code Pro"/>
-              <a:cs typeface="Source Code Pro"/>
-              <a:sym typeface="Source Code Pro"/>
-            </a:endParaRPr>
-          </a:p>
-          <a:p>
-            <a:pPr marL="0" marR="0" lvl="0" indent="0" algn="l" rtl="0">
-              <a:lnSpc>
-                <a:spcPct val="115000"/>
-              </a:lnSpc>
-              <a:spcBef>
-                <a:spcPts val="0"/>
-              </a:spcBef>
-              <a:spcAft>
-                <a:spcPts val="0"/>
-              </a:spcAft>
-              <a:buNone/>
-            </a:pPr>
-            <a:r>
-              <a:rPr lang="en" sz="1300" b="1">
-                <a:solidFill>
-                  <a:schemeClr val="dk1"/>
-                </a:solidFill>
-                <a:latin typeface="Source Code Pro"/>
-                <a:ea typeface="Source Code Pro"/>
-                <a:cs typeface="Source Code Pro"/>
-                <a:sym typeface="Source Code Pro"/>
-              </a:rPr>
-              <a:t>$ tar</a:t>
-            </a:r>
-            <a:r>
-              <a:rPr lang="en" sz="1300" b="1">
-                <a:solidFill>
-                  <a:schemeClr val="dk1"/>
-                </a:solidFill>
-                <a:highlight>
-                  <a:srgbClr val="00FFFF"/>
-                </a:highlight>
-                <a:latin typeface="Source Code Pro"/>
-                <a:ea typeface="Source Code Pro"/>
-                <a:cs typeface="Source Code Pro"/>
-                <a:sym typeface="Source Code Pro"/>
-              </a:rPr>
-              <a:t> </a:t>
-            </a:r>
-            <a:r>
-              <a:rPr lang="en" sz="1300" b="1">
-                <a:solidFill>
-                  <a:schemeClr val="dk1"/>
-                </a:solidFill>
-                <a:latin typeface="Source Code Pro"/>
-                <a:ea typeface="Source Code Pro"/>
-                <a:cs typeface="Source Code Pro"/>
-                <a:sym typeface="Source Code Pro"/>
-              </a:rPr>
-              <a:t>-xvvf</a:t>
-            </a:r>
-            <a:r>
-              <a:rPr lang="en" sz="1300" b="1">
-                <a:solidFill>
-                  <a:schemeClr val="dk1"/>
-                </a:solidFill>
-                <a:highlight>
-                  <a:srgbClr val="00FFFF"/>
-                </a:highlight>
-                <a:latin typeface="Source Code Pro"/>
-                <a:ea typeface="Source Code Pro"/>
-                <a:cs typeface="Source Code Pro"/>
-                <a:sym typeface="Source Code Pro"/>
-              </a:rPr>
-              <a:t> </a:t>
-            </a:r>
-            <a:r>
-              <a:rPr lang="en" sz="1300" b="1">
-                <a:solidFill>
-                  <a:schemeClr val="dk1"/>
-                </a:solidFill>
-                <a:latin typeface="Source Code Pro"/>
-                <a:ea typeface="Source Code Pro"/>
-                <a:cs typeface="Source Code Pro"/>
-                <a:sym typeface="Source Code Pro"/>
-              </a:rPr>
-              <a:t>running_code_cluster2.tar</a:t>
-            </a:r>
-            <a:r>
-              <a:rPr lang="en" sz="1300" b="1">
-                <a:solidFill>
-                  <a:schemeClr val="dk1"/>
-                </a:solidFill>
-                <a:highlight>
-                  <a:srgbClr val="00FF00"/>
-                </a:highlight>
-                <a:latin typeface="Source Code Pro"/>
-                <a:ea typeface="Source Code Pro"/>
-                <a:cs typeface="Source Code Pro"/>
-                <a:sym typeface="Source Code Pro"/>
-              </a:rPr>
-              <a:t>&lt;ENTER&gt;</a:t>
-            </a:r>
-            <a:endParaRPr sz="1300" b="1">
-              <a:solidFill>
-                <a:schemeClr val="dk1"/>
-              </a:solidFill>
-              <a:latin typeface="Source Code Pro"/>
-              <a:ea typeface="Source Code Pro"/>
-              <a:cs typeface="Source Code Pro"/>
-              <a:sym typeface="Source Code Pro"/>
-            </a:endParaRPr>
-          </a:p>
-          <a:p>
-            <a:pPr marL="0" lvl="0" indent="0" algn="l" rtl="0">
-              <a:spcBef>
-                <a:spcPts val="0"/>
-              </a:spcBef>
-              <a:spcAft>
-                <a:spcPts val="0"/>
-              </a:spcAft>
-              <a:buClr>
-                <a:schemeClr val="dk1"/>
-              </a:buClr>
-              <a:buSzPts val="1100"/>
-              <a:buFont typeface="Arial"/>
-              <a:buNone/>
-            </a:pPr>
-            <a:endParaRPr sz="1300" b="1">
-              <a:solidFill>
-                <a:srgbClr val="000000"/>
-              </a:solidFill>
-              <a:latin typeface="Times New Roman"/>
-              <a:ea typeface="Times New Roman"/>
-              <a:cs typeface="Times New Roman"/>
-              <a:sym typeface="Times New Roman"/>
-            </a:endParaRPr>
-          </a:p>
-          <a:p>
-            <a:pPr marL="0" marR="0" lvl="0" indent="0" algn="l" rtl="0">
-              <a:lnSpc>
-                <a:spcPct val="115000"/>
-              </a:lnSpc>
-              <a:spcBef>
-                <a:spcPts val="0"/>
-              </a:spcBef>
-              <a:spcAft>
-                <a:spcPts val="0"/>
-              </a:spcAft>
-              <a:buNone/>
-            </a:pPr>
-            <a:r>
-              <a:rPr lang="en" sz="1300" b="1">
-                <a:solidFill>
-                  <a:srgbClr val="000000"/>
-                </a:solidFill>
-                <a:latin typeface="Times New Roman"/>
-                <a:ea typeface="Times New Roman"/>
-                <a:cs typeface="Times New Roman"/>
-                <a:sym typeface="Times New Roman"/>
-              </a:rPr>
-              <a:t>Change folders:</a:t>
-            </a:r>
-            <a:endParaRPr sz="1300" b="1">
-              <a:solidFill>
-                <a:schemeClr val="dk1"/>
-              </a:solidFill>
-              <a:latin typeface="Source Code Pro"/>
-              <a:ea typeface="Source Code Pro"/>
-              <a:cs typeface="Source Code Pro"/>
-              <a:sym typeface="Source Code Pro"/>
-            </a:endParaRPr>
-          </a:p>
-          <a:p>
-            <a:pPr marL="0" marR="0" lvl="0" indent="0" algn="l" rtl="0">
-              <a:lnSpc>
-                <a:spcPct val="115000"/>
-              </a:lnSpc>
-              <a:spcBef>
-                <a:spcPts val="0"/>
-              </a:spcBef>
-              <a:spcAft>
-                <a:spcPts val="0"/>
-              </a:spcAft>
-              <a:buNone/>
-            </a:pPr>
-            <a:r>
-              <a:rPr lang="en" sz="1300" b="1">
-                <a:solidFill>
-                  <a:schemeClr val="dk1"/>
-                </a:solidFill>
-                <a:latin typeface="Source Code Pro"/>
-                <a:ea typeface="Source Code Pro"/>
-                <a:cs typeface="Source Code Pro"/>
-                <a:sym typeface="Source Code Pro"/>
-              </a:rPr>
-              <a:t>$ cd</a:t>
-            </a:r>
-            <a:r>
-              <a:rPr lang="en" sz="1300" b="1">
-                <a:solidFill>
-                  <a:schemeClr val="dk1"/>
-                </a:solidFill>
-                <a:highlight>
-                  <a:srgbClr val="00FFFF"/>
-                </a:highlight>
-                <a:latin typeface="Source Code Pro"/>
-                <a:ea typeface="Source Code Pro"/>
-                <a:cs typeface="Source Code Pro"/>
-                <a:sym typeface="Source Code Pro"/>
-              </a:rPr>
-              <a:t> </a:t>
-            </a:r>
-            <a:r>
-              <a:rPr lang="en" sz="1300" b="1">
-                <a:solidFill>
-                  <a:schemeClr val="dk1"/>
-                </a:solidFill>
-                <a:latin typeface="Source Code Pro"/>
-                <a:ea typeface="Source Code Pro"/>
-                <a:cs typeface="Source Code Pro"/>
-                <a:sym typeface="Source Code Pro"/>
-              </a:rPr>
-              <a:t>running_code_cluster2/</a:t>
-            </a:r>
-            <a:r>
-              <a:rPr lang="en" sz="1300" b="1">
-                <a:solidFill>
-                  <a:schemeClr val="dk1"/>
-                </a:solidFill>
-                <a:highlight>
-                  <a:srgbClr val="00FF00"/>
-                </a:highlight>
-                <a:latin typeface="Source Code Pro"/>
-                <a:ea typeface="Source Code Pro"/>
-                <a:cs typeface="Source Code Pro"/>
-                <a:sym typeface="Source Code Pro"/>
-              </a:rPr>
-              <a:t>&lt;ENTER&gt;</a:t>
-            </a:r>
-            <a:endParaRPr sz="1300" b="1">
-              <a:solidFill>
-                <a:schemeClr val="dk1"/>
-              </a:solidFill>
-              <a:highlight>
-                <a:srgbClr val="00FF00"/>
-              </a:highlight>
-              <a:latin typeface="Source Code Pro"/>
-              <a:ea typeface="Source Code Pro"/>
-              <a:cs typeface="Source Code Pro"/>
-              <a:sym typeface="Source Code Pro"/>
-            </a:endParaRPr>
-          </a:p>
-          <a:p>
-            <a:pPr marL="0" marR="0" lvl="0" indent="0" algn="l" rtl="0">
-              <a:lnSpc>
-                <a:spcPct val="115000"/>
-              </a:lnSpc>
-              <a:spcBef>
-                <a:spcPts val="0"/>
-              </a:spcBef>
-              <a:spcAft>
-                <a:spcPts val="0"/>
-              </a:spcAft>
-              <a:buNone/>
-            </a:pPr>
-            <a:endParaRPr sz="1300" b="1">
-              <a:solidFill>
-                <a:schemeClr val="dk1"/>
-              </a:solidFill>
-              <a:highlight>
-                <a:srgbClr val="00FF00"/>
-              </a:highlight>
-              <a:latin typeface="Source Code Pro"/>
-              <a:ea typeface="Source Code Pro"/>
-              <a:cs typeface="Source Code Pro"/>
-              <a:sym typeface="Source Code Pro"/>
-            </a:endParaRPr>
-          </a:p>
-          <a:p>
-            <a:pPr marL="0" marR="0" lvl="0" indent="0" algn="l" rtl="0">
-              <a:lnSpc>
-                <a:spcPct val="115000"/>
-              </a:lnSpc>
-              <a:spcBef>
-                <a:spcPts val="0"/>
-              </a:spcBef>
-              <a:spcAft>
-                <a:spcPts val="0"/>
-              </a:spcAft>
-              <a:buNone/>
-            </a:pPr>
-            <a:r>
-              <a:rPr lang="en" sz="1300" b="1">
-                <a:solidFill>
-                  <a:schemeClr val="dk1"/>
-                </a:solidFill>
-                <a:latin typeface="Source Code Pro"/>
-                <a:ea typeface="Source Code Pro"/>
-                <a:cs typeface="Source Code Pro"/>
-                <a:sym typeface="Source Code Pro"/>
-              </a:rPr>
-              <a:t>$ ls</a:t>
-            </a:r>
-            <a:r>
-              <a:rPr lang="en" sz="1300" b="1">
-                <a:solidFill>
-                  <a:schemeClr val="dk1"/>
-                </a:solidFill>
-                <a:highlight>
-                  <a:srgbClr val="00FFFF"/>
-                </a:highlight>
-                <a:latin typeface="Source Code Pro"/>
-                <a:ea typeface="Source Code Pro"/>
-                <a:cs typeface="Source Code Pro"/>
-                <a:sym typeface="Source Code Pro"/>
-              </a:rPr>
-              <a:t> </a:t>
-            </a:r>
-            <a:r>
-              <a:rPr lang="en" sz="1300" b="1">
-                <a:solidFill>
-                  <a:schemeClr val="dk1"/>
-                </a:solidFill>
-                <a:latin typeface="Source Code Pro"/>
-                <a:ea typeface="Source Code Pro"/>
-                <a:cs typeface="Source Code Pro"/>
-                <a:sym typeface="Source Code Pro"/>
-              </a:rPr>
-              <a:t>-l</a:t>
-            </a:r>
-            <a:r>
-              <a:rPr lang="en" sz="1300" b="1">
-                <a:solidFill>
-                  <a:schemeClr val="dk1"/>
-                </a:solidFill>
-                <a:highlight>
-                  <a:srgbClr val="00FF00"/>
-                </a:highlight>
-                <a:latin typeface="Source Code Pro"/>
-                <a:ea typeface="Source Code Pro"/>
-                <a:cs typeface="Source Code Pro"/>
-                <a:sym typeface="Source Code Pro"/>
-              </a:rPr>
-              <a:t> </a:t>
-            </a:r>
-            <a:endParaRPr sz="1300" b="1">
-              <a:solidFill>
-                <a:schemeClr val="dk1"/>
-              </a:solidFill>
-              <a:highlight>
-                <a:srgbClr val="00FF00"/>
-              </a:highlight>
-              <a:latin typeface="Source Code Pro"/>
-              <a:ea typeface="Source Code Pro"/>
-              <a:cs typeface="Source Code Pro"/>
-              <a:sym typeface="Source Code Pro"/>
-            </a:endParaRPr>
-          </a:p>
-          <a:p>
-            <a:pPr marL="0" marR="0" lvl="0" indent="457200" algn="l" rtl="0">
-              <a:lnSpc>
-                <a:spcPct val="115000"/>
-              </a:lnSpc>
-              <a:spcBef>
-                <a:spcPts val="0"/>
-              </a:spcBef>
-              <a:spcAft>
-                <a:spcPts val="0"/>
-              </a:spcAft>
-              <a:buClr>
-                <a:schemeClr val="dk1"/>
-              </a:buClr>
-              <a:buSzPts val="1100"/>
-              <a:buFont typeface="Arial"/>
-              <a:buNone/>
-            </a:pPr>
-            <a:endParaRPr b="1">
-              <a:solidFill>
-                <a:schemeClr val="dk1"/>
-              </a:solidFill>
-              <a:latin typeface="Source Code Pro"/>
-              <a:ea typeface="Source Code Pro"/>
-              <a:cs typeface="Source Code Pro"/>
-              <a:sym typeface="Source Code Pro"/>
-            </a:endParaRPr>
-          </a:p>
-          <a:p>
-            <a:pPr marL="0" marR="0" lvl="0" indent="0" algn="l" rtl="0">
-              <a:lnSpc>
-                <a:spcPct val="115000"/>
-              </a:lnSpc>
-              <a:spcBef>
-                <a:spcPts val="0"/>
-              </a:spcBef>
-              <a:spcAft>
-                <a:spcPts val="0"/>
-              </a:spcAft>
-              <a:buNone/>
-            </a:pPr>
-            <a:endParaRPr b="1">
-              <a:solidFill>
-                <a:schemeClr val="dk1"/>
-              </a:solidFill>
-              <a:highlight>
-                <a:srgbClr val="00FF00"/>
-              </a:highlight>
-              <a:latin typeface="Source Code Pro"/>
-              <a:ea typeface="Source Code Pro"/>
-              <a:cs typeface="Source Code Pro"/>
+              <a:latin typeface="Consolas" charset="0"/>
+              <a:ea typeface="Consolas" charset="0"/>
+              <a:cs typeface="Consolas" charset="0"/>
               <a:sym typeface="Source Code Pro"/>
             </a:endParaRPr>
           </a:p>
@@ -28918,9 +29422,9 @@
                 <a:solidFill>
                   <a:schemeClr val="dk1"/>
                 </a:solidFill>
-                <a:latin typeface="Source Code Pro"/>
-                <a:ea typeface="Source Code Pro"/>
-                <a:cs typeface="Source Code Pro"/>
+                <a:latin typeface="Consolas" charset="0"/>
+                <a:ea typeface="Consolas" charset="0"/>
+                <a:cs typeface="Consolas" charset="0"/>
                 <a:sym typeface="Source Code Pro"/>
               </a:rPr>
               <a:t>$ module</a:t>
@@ -28933,9 +29437,9 @@
                 <a:highlight>
                   <a:srgbClr val="00FFFF"/>
                 </a:highlight>
-                <a:latin typeface="Source Code Pro"/>
-                <a:ea typeface="Source Code Pro"/>
-                <a:cs typeface="Source Code Pro"/>
+                <a:latin typeface="Consolas" charset="0"/>
+                <a:ea typeface="Consolas" charset="0"/>
+                <a:cs typeface="Consolas" charset="0"/>
                 <a:sym typeface="Source Code Pro"/>
               </a:rPr>
               <a:t> </a:t>
@@ -28945,14 +29449,18 @@
                 <a:solidFill>
                   <a:schemeClr val="dk1"/>
                 </a:solidFill>
-                <a:latin typeface="Source Code Pro"/>
-                <a:ea typeface="Source Code Pro"/>
-                <a:cs typeface="Source Code Pro"/>
+                <a:latin typeface="Consolas" charset="0"/>
+                <a:ea typeface="Consolas" charset="0"/>
+                <a:cs typeface="Consolas" charset="0"/>
                 <a:sym typeface="Source Code Pro"/>
               </a:rPr>
               <a:t>avail</a:t>
             </a:r>
-            <a:endParaRPr sz="1400" dirty="0"/>
+            <a:endParaRPr sz="1400" dirty="0">
+              <a:latin typeface="Consolas" charset="0"/>
+              <a:ea typeface="Consolas" charset="0"/>
+              <a:cs typeface="Consolas" charset="0"/>
+            </a:endParaRPr>
           </a:p>
           <a:p>
             <a:pPr marL="457200" lvl="0" indent="-317500" algn="l" rtl="0">
@@ -28977,9 +29485,9 @@
                 <a:solidFill>
                   <a:schemeClr val="dk1"/>
                 </a:solidFill>
-                <a:latin typeface="Source Code Pro"/>
-                <a:ea typeface="Source Code Pro"/>
-                <a:cs typeface="Source Code Pro"/>
+                <a:latin typeface="Consolas" charset="0"/>
+                <a:ea typeface="Consolas" charset="0"/>
+                <a:cs typeface="Consolas" charset="0"/>
                 <a:sym typeface="Source Code Pro"/>
               </a:rPr>
               <a:t>$ module</a:t>
@@ -28992,9 +29500,9 @@
                 <a:highlight>
                   <a:srgbClr val="00FFFF"/>
                 </a:highlight>
-                <a:latin typeface="Source Code Pro"/>
-                <a:ea typeface="Source Code Pro"/>
-                <a:cs typeface="Source Code Pro"/>
+                <a:latin typeface="Consolas" charset="0"/>
+                <a:ea typeface="Consolas" charset="0"/>
+                <a:cs typeface="Consolas" charset="0"/>
                 <a:sym typeface="Source Code Pro"/>
               </a:rPr>
               <a:t> </a:t>
@@ -29004,14 +29512,18 @@
                 <a:solidFill>
                   <a:schemeClr val="dk1"/>
                 </a:solidFill>
-                <a:latin typeface="Source Code Pro"/>
-                <a:ea typeface="Source Code Pro"/>
-                <a:cs typeface="Source Code Pro"/>
+                <a:latin typeface="Consolas" charset="0"/>
+                <a:ea typeface="Consolas" charset="0"/>
+                <a:cs typeface="Consolas" charset="0"/>
                 <a:sym typeface="Source Code Pro"/>
               </a:rPr>
               <a:t>list</a:t>
             </a:r>
-            <a:endParaRPr sz="1400" dirty="0"/>
+            <a:endParaRPr sz="1400" dirty="0">
+              <a:latin typeface="Consolas" charset="0"/>
+              <a:ea typeface="Consolas" charset="0"/>
+              <a:cs typeface="Consolas" charset="0"/>
+            </a:endParaRPr>
           </a:p>
           <a:p>
             <a:pPr marL="457200" lvl="0" indent="-317500" algn="l" rtl="0">
@@ -29036,9 +29548,9 @@
                 <a:solidFill>
                   <a:schemeClr val="dk1"/>
                 </a:solidFill>
-                <a:latin typeface="Source Code Pro"/>
-                <a:ea typeface="Source Code Pro"/>
-                <a:cs typeface="Source Code Pro"/>
+                <a:latin typeface="Consolas" charset="0"/>
+                <a:ea typeface="Consolas" charset="0"/>
+                <a:cs typeface="Consolas" charset="0"/>
                 <a:sym typeface="Source Code Pro"/>
               </a:rPr>
               <a:t>$ module</a:t>
@@ -29051,9 +29563,9 @@
                 <a:highlight>
                   <a:srgbClr val="00FFFF"/>
                 </a:highlight>
-                <a:latin typeface="Source Code Pro"/>
-                <a:ea typeface="Source Code Pro"/>
-                <a:cs typeface="Source Code Pro"/>
+                <a:latin typeface="Consolas" charset="0"/>
+                <a:ea typeface="Consolas" charset="0"/>
+                <a:cs typeface="Consolas" charset="0"/>
                 <a:sym typeface="Source Code Pro"/>
               </a:rPr>
               <a:t> </a:t>
@@ -29063,9 +29575,9 @@
                 <a:solidFill>
                   <a:schemeClr val="dk1"/>
                 </a:solidFill>
-                <a:latin typeface="Source Code Pro"/>
-                <a:ea typeface="Source Code Pro"/>
-                <a:cs typeface="Source Code Pro"/>
+                <a:latin typeface="Consolas" charset="0"/>
+                <a:ea typeface="Consolas" charset="0"/>
+                <a:cs typeface="Consolas" charset="0"/>
                 <a:sym typeface="Source Code Pro"/>
               </a:rPr>
               <a:t>spider</a:t>
@@ -29078,9 +29590,9 @@
                 <a:highlight>
                   <a:srgbClr val="00FFFF"/>
                 </a:highlight>
-                <a:latin typeface="Source Code Pro"/>
-                <a:ea typeface="Source Code Pro"/>
-                <a:cs typeface="Source Code Pro"/>
+                <a:latin typeface="Consolas" charset="0"/>
+                <a:ea typeface="Consolas" charset="0"/>
+                <a:cs typeface="Consolas" charset="0"/>
                 <a:sym typeface="Source Code Pro"/>
               </a:rPr>
               <a:t> </a:t>
@@ -29090,9 +29602,9 @@
                 <a:solidFill>
                   <a:schemeClr val="dk1"/>
                 </a:solidFill>
-                <a:latin typeface="Source Code Pro"/>
-                <a:ea typeface="Source Code Pro"/>
-                <a:cs typeface="Source Code Pro"/>
+                <a:latin typeface="Consolas" charset="0"/>
+                <a:ea typeface="Consolas" charset="0"/>
+                <a:cs typeface="Consolas" charset="0"/>
                 <a:sym typeface="Source Code Pro"/>
               </a:rPr>
               <a:t>StdEnv</a:t>
@@ -29102,9 +29614,9 @@
                 <a:solidFill>
                   <a:schemeClr val="dk1"/>
                 </a:solidFill>
-                <a:latin typeface="Source Code Pro"/>
-                <a:ea typeface="Source Code Pro"/>
-                <a:cs typeface="Source Code Pro"/>
+                <a:latin typeface="Consolas" charset="0"/>
+                <a:ea typeface="Consolas" charset="0"/>
+                <a:cs typeface="Consolas" charset="0"/>
                 <a:sym typeface="Source Code Pro"/>
               </a:rPr>
               <a:t>/2016.4</a:t>
@@ -29113,9 +29625,9 @@
               <a:solidFill>
                 <a:schemeClr val="dk1"/>
               </a:solidFill>
-              <a:latin typeface="Source Code Pro"/>
-              <a:ea typeface="Source Code Pro"/>
-              <a:cs typeface="Source Code Pro"/>
+              <a:latin typeface="Consolas" charset="0"/>
+              <a:ea typeface="Consolas" charset="0"/>
+              <a:cs typeface="Consolas" charset="0"/>
               <a:sym typeface="Source Code Pro"/>
             </a:endParaRPr>
           </a:p>
@@ -29142,9 +29654,9 @@
                 <a:solidFill>
                   <a:schemeClr val="dk1"/>
                 </a:solidFill>
-                <a:latin typeface="Source Code Pro"/>
-                <a:ea typeface="Source Code Pro"/>
-                <a:cs typeface="Source Code Pro"/>
+                <a:latin typeface="Consolas" charset="0"/>
+                <a:ea typeface="Consolas" charset="0"/>
+                <a:cs typeface="Consolas" charset="0"/>
                 <a:sym typeface="Source Code Pro"/>
               </a:rPr>
               <a:t>$ module</a:t>
@@ -29157,9 +29669,9 @@
                 <a:highlight>
                   <a:srgbClr val="00FFFF"/>
                 </a:highlight>
-                <a:latin typeface="Source Code Pro"/>
-                <a:ea typeface="Source Code Pro"/>
-                <a:cs typeface="Source Code Pro"/>
+                <a:latin typeface="Consolas" charset="0"/>
+                <a:ea typeface="Consolas" charset="0"/>
+                <a:cs typeface="Consolas" charset="0"/>
                 <a:sym typeface="Source Code Pro"/>
               </a:rPr>
               <a:t> </a:t>
@@ -29169,9 +29681,9 @@
                 <a:solidFill>
                   <a:schemeClr val="dk1"/>
                 </a:solidFill>
-                <a:latin typeface="Source Code Pro"/>
-                <a:ea typeface="Source Code Pro"/>
-                <a:cs typeface="Source Code Pro"/>
+                <a:latin typeface="Consolas" charset="0"/>
+                <a:ea typeface="Consolas" charset="0"/>
+                <a:cs typeface="Consolas" charset="0"/>
                 <a:sym typeface="Source Code Pro"/>
               </a:rPr>
               <a:t>spider</a:t>
@@ -29184,9 +29696,9 @@
                 <a:highlight>
                   <a:srgbClr val="00FFFF"/>
                 </a:highlight>
-                <a:latin typeface="Source Code Pro"/>
-                <a:ea typeface="Source Code Pro"/>
-                <a:cs typeface="Source Code Pro"/>
+                <a:latin typeface="Consolas" charset="0"/>
+                <a:ea typeface="Consolas" charset="0"/>
+                <a:cs typeface="Consolas" charset="0"/>
                 <a:sym typeface="Source Code Pro"/>
               </a:rPr>
               <a:t> </a:t>
@@ -29196,9 +29708,9 @@
                 <a:solidFill>
                   <a:schemeClr val="dk1"/>
                 </a:solidFill>
-                <a:latin typeface="Source Code Pro"/>
-                <a:ea typeface="Source Code Pro"/>
-                <a:cs typeface="Source Code Pro"/>
+                <a:latin typeface="Consolas" charset="0"/>
+                <a:ea typeface="Consolas" charset="0"/>
+                <a:cs typeface="Consolas" charset="0"/>
                 <a:sym typeface="Source Code Pro"/>
               </a:rPr>
               <a:t>StdEnv</a:t>
@@ -29207,9 +29719,9 @@
               <a:solidFill>
                 <a:schemeClr val="dk1"/>
               </a:solidFill>
-              <a:latin typeface="Source Code Pro"/>
-              <a:ea typeface="Source Code Pro"/>
-              <a:cs typeface="Source Code Pro"/>
+              <a:latin typeface="Consolas" charset="0"/>
+              <a:ea typeface="Consolas" charset="0"/>
+              <a:cs typeface="Consolas" charset="0"/>
               <a:sym typeface="Source Code Pro"/>
             </a:endParaRPr>
           </a:p>
@@ -29339,39 +29851,128 @@
                 <a:solidFill>
                   <a:schemeClr val="dk1"/>
                 </a:solidFill>
+                <a:latin typeface="Consolas" charset="0"/>
+                <a:ea typeface="Consolas" charset="0"/>
+                <a:cs typeface="Consolas" charset="0"/>
+                <a:sym typeface="Source Code Pro"/>
+              </a:rPr>
+              <a:t>$ module</a:t>
+            </a:r>
+            <a:r>
+              <a:rPr lang="en" b="1" dirty="0">
+                <a:solidFill>
+                  <a:schemeClr val="dk1"/>
+                </a:solidFill>
+                <a:highlight>
+                  <a:srgbClr val="00FFFF"/>
+                </a:highlight>
+                <a:latin typeface="Consolas" charset="0"/>
+                <a:ea typeface="Consolas" charset="0"/>
+                <a:cs typeface="Consolas" charset="0"/>
+                <a:sym typeface="Source Code Pro"/>
+              </a:rPr>
+              <a:t> </a:t>
+            </a:r>
+            <a:r>
+              <a:rPr lang="en" b="1" dirty="0">
+                <a:solidFill>
+                  <a:schemeClr val="dk1"/>
+                </a:solidFill>
+                <a:latin typeface="Consolas" charset="0"/>
+                <a:ea typeface="Consolas" charset="0"/>
+                <a:cs typeface="Consolas" charset="0"/>
+                <a:sym typeface="Source Code Pro"/>
+              </a:rPr>
+              <a:t>keyword</a:t>
+            </a:r>
+            <a:r>
+              <a:rPr lang="en" b="1" dirty="0">
+                <a:solidFill>
+                  <a:schemeClr val="dk1"/>
+                </a:solidFill>
+                <a:highlight>
+                  <a:srgbClr val="00FFFF"/>
+                </a:highlight>
+                <a:latin typeface="Consolas" charset="0"/>
+                <a:ea typeface="Consolas" charset="0"/>
+                <a:cs typeface="Consolas" charset="0"/>
+                <a:sym typeface="Source Code Pro"/>
+              </a:rPr>
+              <a:t> </a:t>
+            </a:r>
+            <a:r>
+              <a:rPr lang="en" b="1" dirty="0">
+                <a:solidFill>
+                  <a:schemeClr val="dk1"/>
+                </a:solidFill>
+                <a:latin typeface="Consolas" charset="0"/>
+                <a:ea typeface="Consolas" charset="0"/>
+                <a:cs typeface="Consolas" charset="0"/>
+                <a:sym typeface="Source Code Pro"/>
+              </a:rPr>
+              <a:t>key1</a:t>
+            </a:r>
+            <a:r>
+              <a:rPr lang="en" b="1" dirty="0">
+                <a:solidFill>
+                  <a:schemeClr val="dk1"/>
+                </a:solidFill>
+                <a:highlight>
+                  <a:srgbClr val="00FFFF"/>
+                </a:highlight>
+                <a:latin typeface="Consolas" charset="0"/>
+                <a:ea typeface="Consolas" charset="0"/>
+                <a:cs typeface="Consolas" charset="0"/>
+                <a:sym typeface="Source Code Pro"/>
+              </a:rPr>
+              <a:t> </a:t>
+            </a:r>
+            <a:r>
+              <a:rPr lang="en" b="1" dirty="0">
+                <a:solidFill>
+                  <a:schemeClr val="dk1"/>
+                </a:solidFill>
+                <a:latin typeface="Consolas" charset="0"/>
+                <a:ea typeface="Consolas" charset="0"/>
+                <a:cs typeface="Consolas" charset="0"/>
+                <a:sym typeface="Source Code Pro"/>
+              </a:rPr>
+              <a:t>key1</a:t>
+            </a:r>
+            <a:r>
+              <a:rPr lang="en" b="1" dirty="0">
+                <a:solidFill>
+                  <a:schemeClr val="dk1"/>
+                </a:solidFill>
                 <a:latin typeface="Source Code Pro"/>
                 <a:ea typeface="Source Code Pro"/>
                 <a:cs typeface="Source Code Pro"/>
                 <a:sym typeface="Source Code Pro"/>
               </a:rPr>
-              <a:t>$ module</a:t>
-            </a:r>
-            <a:r>
+              <a:t/>
+            </a:r>
+            <a:br>
               <a:rPr lang="en" b="1" dirty="0">
                 <a:solidFill>
                   <a:schemeClr val="dk1"/>
                 </a:solidFill>
-                <a:highlight>
-                  <a:srgbClr val="00FFFF"/>
-                </a:highlight>
                 <a:latin typeface="Source Code Pro"/>
                 <a:ea typeface="Source Code Pro"/>
                 <a:cs typeface="Source Code Pro"/>
                 <a:sym typeface="Source Code Pro"/>
               </a:rPr>
-              <a:t> </a:t>
-            </a:r>
+            </a:br>
             <a:r>
               <a:rPr lang="en" b="1" dirty="0">
                 <a:solidFill>
                   <a:schemeClr val="dk1"/>
                 </a:solidFill>
-                <a:latin typeface="Source Code Pro"/>
-                <a:ea typeface="Source Code Pro"/>
-                <a:cs typeface="Source Code Pro"/>
+                <a:latin typeface="Consolas" charset="0"/>
+                <a:ea typeface="Consolas" charset="0"/>
+                <a:cs typeface="Consolas" charset="0"/>
                 <a:sym typeface="Source Code Pro"/>
               </a:rPr>
-              <a:t>keyword</a:t>
+              <a:t>$ module</a:t>
             </a:r>
             <a:r>
               <a:rPr lang="en" b="1" dirty="0">
@@ -29381,9 +29982,9 @@
                 <a:highlight>
                   <a:srgbClr val="00FFFF"/>
                 </a:highlight>
-                <a:latin typeface="Source Code Pro"/>
-                <a:ea typeface="Source Code Pro"/>
-                <a:cs typeface="Source Code Pro"/>
+                <a:latin typeface="Consolas" charset="0"/>
+                <a:ea typeface="Consolas" charset="0"/>
+                <a:cs typeface="Consolas" charset="0"/>
                 <a:sym typeface="Source Code Pro"/>
               </a:rPr>
               <a:t> </a:t>
@@ -29393,12 +29994,12 @@
                 <a:solidFill>
                   <a:schemeClr val="dk1"/>
                 </a:solidFill>
-                <a:latin typeface="Source Code Pro"/>
-                <a:ea typeface="Source Code Pro"/>
-                <a:cs typeface="Source Code Pro"/>
+                <a:latin typeface="Consolas" charset="0"/>
+                <a:ea typeface="Consolas" charset="0"/>
+                <a:cs typeface="Consolas" charset="0"/>
                 <a:sym typeface="Source Code Pro"/>
               </a:rPr>
-              <a:t>key1</a:t>
+              <a:t>keyword</a:t>
             </a:r>
             <a:r>
               <a:rPr lang="en" b="1" dirty="0">
@@ -29408,9 +30009,9 @@
                 <a:highlight>
                   <a:srgbClr val="00FFFF"/>
                 </a:highlight>
-                <a:latin typeface="Source Code Pro"/>
-                <a:ea typeface="Source Code Pro"/>
-                <a:cs typeface="Source Code Pro"/>
+                <a:latin typeface="Consolas" charset="0"/>
+                <a:ea typeface="Consolas" charset="0"/>
+                <a:cs typeface="Consolas" charset="0"/>
                 <a:sym typeface="Source Code Pro"/>
               </a:rPr>
               <a:t> </a:t>
@@ -29420,35 +30021,12 @@
                 <a:solidFill>
                   <a:schemeClr val="dk1"/>
                 </a:solidFill>
-                <a:latin typeface="Source Code Pro"/>
-                <a:ea typeface="Source Code Pro"/>
-                <a:cs typeface="Source Code Pro"/>
+                <a:latin typeface="Consolas" charset="0"/>
+                <a:ea typeface="Consolas" charset="0"/>
+                <a:cs typeface="Consolas" charset="0"/>
                 <a:sym typeface="Source Code Pro"/>
               </a:rPr>
-              <a:t>key1</a:t>
-            </a:r>
-            <a:br>
-              <a:rPr lang="en" b="1" dirty="0">
-                <a:solidFill>
-                  <a:schemeClr val="dk1"/>
-                </a:solidFill>
-                <a:latin typeface="Source Code Pro"/>
-                <a:ea typeface="Source Code Pro"/>
-                <a:cs typeface="Source Code Pro"/>
-                <a:sym typeface="Source Code Pro"/>
-              </a:rPr>
-            </a:br>
-            <a:r>
-              <a:rPr lang="en" b="1" dirty="0">
-                <a:solidFill>
-                  <a:schemeClr val="dk1"/>
-                </a:solidFill>
-                <a:latin typeface="Source Code Pro"/>
-                <a:ea typeface="Source Code Pro"/>
-                <a:cs typeface="Source Code Pro"/>
-                <a:sym typeface="Source Code Pro"/>
-              </a:rPr>
-              <a:t>$ module</a:t>
+              <a:t>intel</a:t>
             </a:r>
             <a:r>
               <a:rPr lang="en" b="1" dirty="0">
@@ -29458,75 +30036,21 @@
                 <a:highlight>
                   <a:srgbClr val="00FFFF"/>
                 </a:highlight>
-                <a:latin typeface="Source Code Pro"/>
-                <a:ea typeface="Source Code Pro"/>
-                <a:cs typeface="Source Code Pro"/>
+                <a:latin typeface="Consolas" charset="0"/>
+                <a:ea typeface="Consolas" charset="0"/>
+                <a:cs typeface="Consolas" charset="0"/>
                 <a:sym typeface="Source Code Pro"/>
               </a:rPr>
               <a:t> </a:t>
             </a:r>
             <a:r>
-              <a:rPr lang="en" b="1" dirty="0">
-                <a:solidFill>
-                  <a:schemeClr val="dk1"/>
-                </a:solidFill>
-                <a:latin typeface="Source Code Pro"/>
-                <a:ea typeface="Source Code Pro"/>
-                <a:cs typeface="Source Code Pro"/>
-                <a:sym typeface="Source Code Pro"/>
-              </a:rPr>
-              <a:t>keyword</a:t>
-            </a:r>
-            <a:r>
-              <a:rPr lang="en" b="1" dirty="0">
-                <a:solidFill>
-                  <a:schemeClr val="dk1"/>
-                </a:solidFill>
-                <a:highlight>
-                  <a:srgbClr val="00FFFF"/>
-                </a:highlight>
-                <a:latin typeface="Source Code Pro"/>
-                <a:ea typeface="Source Code Pro"/>
-                <a:cs typeface="Source Code Pro"/>
-                <a:sym typeface="Source Code Pro"/>
-              </a:rPr>
-              <a:t> </a:t>
-            </a:r>
-            <a:r>
-              <a:rPr lang="en" b="1" dirty="0">
-                <a:solidFill>
-                  <a:schemeClr val="dk1"/>
-                </a:solidFill>
-                <a:latin typeface="Source Code Pro"/>
-                <a:ea typeface="Source Code Pro"/>
-                <a:cs typeface="Source Code Pro"/>
-                <a:sym typeface="Source Code Pro"/>
-              </a:rPr>
-              <a:t>intel</a:t>
-            </a:r>
-            <a:r>
-              <a:rPr lang="en" b="1" dirty="0">
-                <a:solidFill>
-                  <a:schemeClr val="dk1"/>
-                </a:solidFill>
-                <a:highlight>
-                  <a:srgbClr val="00FFFF"/>
-                </a:highlight>
-                <a:latin typeface="Source Code Pro"/>
-                <a:ea typeface="Source Code Pro"/>
-                <a:cs typeface="Source Code Pro"/>
-                <a:sym typeface="Source Code Pro"/>
-              </a:rPr>
-              <a:t> </a:t>
-            </a:r>
-            <a:r>
               <a:rPr lang="en" b="1" dirty="0" err="1">
                 <a:solidFill>
                   <a:schemeClr val="dk1"/>
                 </a:solidFill>
-                <a:latin typeface="Source Code Pro"/>
-                <a:ea typeface="Source Code Pro"/>
-                <a:cs typeface="Source Code Pro"/>
+                <a:latin typeface="Consolas" charset="0"/>
+                <a:ea typeface="Consolas" charset="0"/>
+                <a:cs typeface="Consolas" charset="0"/>
                 <a:sym typeface="Source Code Pro"/>
               </a:rPr>
               <a:t>mpi</a:t>
@@ -29535,9 +30059,9 @@
               <a:solidFill>
                 <a:schemeClr val="dk1"/>
               </a:solidFill>
-              <a:latin typeface="Source Code Pro"/>
-              <a:ea typeface="Source Code Pro"/>
-              <a:cs typeface="Source Code Pro"/>
+              <a:latin typeface="Consolas" charset="0"/>
+              <a:ea typeface="Consolas" charset="0"/>
+              <a:cs typeface="Consolas" charset="0"/>
               <a:sym typeface="Source Code Pro"/>
             </a:endParaRPr>
           </a:p>
@@ -29587,9 +30111,9 @@
                 <a:solidFill>
                   <a:schemeClr val="dk1"/>
                 </a:solidFill>
-                <a:latin typeface="Source Code Pro"/>
-                <a:ea typeface="Source Code Pro"/>
-                <a:cs typeface="Source Code Pro"/>
+                <a:latin typeface="Consolas" charset="0"/>
+                <a:ea typeface="Consolas" charset="0"/>
+                <a:cs typeface="Consolas" charset="0"/>
                 <a:sym typeface="Source Code Pro"/>
               </a:rPr>
               <a:t>$ module</a:t>
@@ -29602,9 +30126,9 @@
                 <a:highlight>
                   <a:srgbClr val="00FFFF"/>
                 </a:highlight>
-                <a:latin typeface="Source Code Pro"/>
-                <a:ea typeface="Source Code Pro"/>
-                <a:cs typeface="Source Code Pro"/>
+                <a:latin typeface="Consolas" charset="0"/>
+                <a:ea typeface="Consolas" charset="0"/>
+                <a:cs typeface="Consolas" charset="0"/>
                 <a:sym typeface="Source Code Pro"/>
               </a:rPr>
               <a:t> </a:t>
@@ -29614,9 +30138,9 @@
                 <a:solidFill>
                   <a:schemeClr val="dk1"/>
                 </a:solidFill>
-                <a:latin typeface="Source Code Pro"/>
-                <a:ea typeface="Source Code Pro"/>
-                <a:cs typeface="Source Code Pro"/>
+                <a:latin typeface="Consolas" charset="0"/>
+                <a:ea typeface="Consolas" charset="0"/>
+                <a:cs typeface="Consolas" charset="0"/>
                 <a:sym typeface="Source Code Pro"/>
               </a:rPr>
               <a:t>load</a:t>
@@ -29629,9 +30153,9 @@
                 <a:highlight>
                   <a:srgbClr val="00FFFF"/>
                 </a:highlight>
-                <a:latin typeface="Source Code Pro"/>
-                <a:ea typeface="Source Code Pro"/>
-                <a:cs typeface="Source Code Pro"/>
+                <a:latin typeface="Consolas" charset="0"/>
+                <a:ea typeface="Consolas" charset="0"/>
+                <a:cs typeface="Consolas" charset="0"/>
                 <a:sym typeface="Source Code Pro"/>
               </a:rPr>
               <a:t> </a:t>
@@ -29641,9 +30165,9 @@
                 <a:solidFill>
                   <a:schemeClr val="dk1"/>
                 </a:solidFill>
-                <a:latin typeface="Source Code Pro"/>
-                <a:ea typeface="Source Code Pro"/>
-                <a:cs typeface="Source Code Pro"/>
+                <a:latin typeface="Consolas" charset="0"/>
+                <a:ea typeface="Consolas" charset="0"/>
+                <a:cs typeface="Consolas" charset="0"/>
                 <a:sym typeface="Source Code Pro"/>
               </a:rPr>
               <a:t>pgi</a:t>
@@ -29653,9 +30177,9 @@
                 <a:solidFill>
                   <a:schemeClr val="dk1"/>
                 </a:solidFill>
-                <a:latin typeface="Source Code Pro"/>
-                <a:ea typeface="Source Code Pro"/>
-                <a:cs typeface="Source Code Pro"/>
+                <a:latin typeface="Consolas" charset="0"/>
+                <a:ea typeface="Consolas" charset="0"/>
+                <a:cs typeface="Consolas" charset="0"/>
                 <a:sym typeface="Source Code Pro"/>
               </a:rPr>
               <a:t>/19.4</a:t>
@@ -29664,9 +30188,9 @@
               <a:solidFill>
                 <a:schemeClr val="dk1"/>
               </a:solidFill>
-              <a:latin typeface="Times New Roman"/>
-              <a:ea typeface="Times New Roman"/>
-              <a:cs typeface="Times New Roman"/>
+              <a:latin typeface="Consolas" charset="0"/>
+              <a:ea typeface="Consolas" charset="0"/>
+              <a:cs typeface="Consolas" charset="0"/>
               <a:sym typeface="Times New Roman"/>
             </a:endParaRPr>
           </a:p>
@@ -29716,9 +30240,9 @@
                 <a:solidFill>
                   <a:schemeClr val="dk1"/>
                 </a:solidFill>
-                <a:latin typeface="Source Code Pro"/>
-                <a:ea typeface="Source Code Pro"/>
-                <a:cs typeface="Source Code Pro"/>
+                <a:latin typeface="Consolas" charset="0"/>
+                <a:ea typeface="Consolas" charset="0"/>
+                <a:cs typeface="Consolas" charset="0"/>
                 <a:sym typeface="Source Code Pro"/>
               </a:rPr>
               <a:t>$ module</a:t>
@@ -29731,9 +30255,9 @@
                 <a:highlight>
                   <a:srgbClr val="00FFFF"/>
                 </a:highlight>
-                <a:latin typeface="Source Code Pro"/>
-                <a:ea typeface="Source Code Pro"/>
-                <a:cs typeface="Source Code Pro"/>
+                <a:latin typeface="Consolas" charset="0"/>
+                <a:ea typeface="Consolas" charset="0"/>
+                <a:cs typeface="Consolas" charset="0"/>
                 <a:sym typeface="Source Code Pro"/>
               </a:rPr>
               <a:t> </a:t>
@@ -29743,9 +30267,9 @@
                 <a:solidFill>
                   <a:schemeClr val="dk1"/>
                 </a:solidFill>
-                <a:latin typeface="Source Code Pro"/>
-                <a:ea typeface="Source Code Pro"/>
-                <a:cs typeface="Source Code Pro"/>
+                <a:latin typeface="Consolas" charset="0"/>
+                <a:ea typeface="Consolas" charset="0"/>
+                <a:cs typeface="Consolas" charset="0"/>
                 <a:sym typeface="Source Code Pro"/>
               </a:rPr>
               <a:t>swap</a:t>
@@ -29758,9 +30282,9 @@
                 <a:highlight>
                   <a:srgbClr val="00FFFF"/>
                 </a:highlight>
-                <a:latin typeface="Source Code Pro"/>
-                <a:ea typeface="Source Code Pro"/>
-                <a:cs typeface="Source Code Pro"/>
+                <a:latin typeface="Consolas" charset="0"/>
+                <a:ea typeface="Consolas" charset="0"/>
+                <a:cs typeface="Consolas" charset="0"/>
                 <a:sym typeface="Source Code Pro"/>
               </a:rPr>
               <a:t> </a:t>
@@ -29770,9 +30294,9 @@
                 <a:solidFill>
                   <a:schemeClr val="dk1"/>
                 </a:solidFill>
-                <a:latin typeface="Source Code Pro"/>
-                <a:ea typeface="Source Code Pro"/>
-                <a:cs typeface="Source Code Pro"/>
+                <a:latin typeface="Consolas" charset="0"/>
+                <a:ea typeface="Consolas" charset="0"/>
+                <a:cs typeface="Consolas" charset="0"/>
                 <a:sym typeface="Source Code Pro"/>
               </a:rPr>
               <a:t>StdEnv</a:t>
@@ -29782,9 +30306,9 @@
                 <a:solidFill>
                   <a:schemeClr val="dk1"/>
                 </a:solidFill>
-                <a:latin typeface="Source Code Pro"/>
-                <a:ea typeface="Source Code Pro"/>
-                <a:cs typeface="Source Code Pro"/>
+                <a:latin typeface="Consolas" charset="0"/>
+                <a:ea typeface="Consolas" charset="0"/>
+                <a:cs typeface="Consolas" charset="0"/>
                 <a:sym typeface="Source Code Pro"/>
               </a:rPr>
               <a:t>/2016.4</a:t>
@@ -29797,9 +30321,9 @@
                 <a:highlight>
                   <a:srgbClr val="00FFFF"/>
                 </a:highlight>
-                <a:latin typeface="Source Code Pro"/>
-                <a:ea typeface="Source Code Pro"/>
-                <a:cs typeface="Source Code Pro"/>
+                <a:latin typeface="Consolas" charset="0"/>
+                <a:ea typeface="Consolas" charset="0"/>
+                <a:cs typeface="Consolas" charset="0"/>
                 <a:sym typeface="Source Code Pro"/>
               </a:rPr>
               <a:t> </a:t>
@@ -29809,9 +30333,9 @@
                 <a:solidFill>
                   <a:schemeClr val="dk1"/>
                 </a:solidFill>
-                <a:latin typeface="Source Code Pro"/>
-                <a:ea typeface="Source Code Pro"/>
-                <a:cs typeface="Source Code Pro"/>
+                <a:latin typeface="Consolas" charset="0"/>
+                <a:ea typeface="Consolas" charset="0"/>
+                <a:cs typeface="Consolas" charset="0"/>
                 <a:sym typeface="Source Code Pro"/>
               </a:rPr>
               <a:t>StdEnv</a:t>
@@ -29821,9 +30345,9 @@
                 <a:solidFill>
                   <a:schemeClr val="dk1"/>
                 </a:solidFill>
-                <a:latin typeface="Source Code Pro"/>
-                <a:ea typeface="Source Code Pro"/>
-                <a:cs typeface="Source Code Pro"/>
+                <a:latin typeface="Consolas" charset="0"/>
+                <a:ea typeface="Consolas" charset="0"/>
+                <a:cs typeface="Consolas" charset="0"/>
                 <a:sym typeface="Source Code Pro"/>
               </a:rPr>
               <a:t>/2018.4</a:t>
@@ -29832,9 +30356,9 @@
               <a:solidFill>
                 <a:schemeClr val="dk1"/>
               </a:solidFill>
-              <a:latin typeface="Source Code Pro"/>
-              <a:ea typeface="Source Code Pro"/>
-              <a:cs typeface="Source Code Pro"/>
+              <a:latin typeface="Consolas" charset="0"/>
+              <a:ea typeface="Consolas" charset="0"/>
+              <a:cs typeface="Consolas" charset="0"/>
               <a:sym typeface="Source Code Pro"/>
             </a:endParaRPr>
           </a:p>

</xml_diff>